<commit_message>
before checking where the stuff with homepage
</commit_message>
<xml_diff>
--- a/planning/reports/Presentation1.pptx
+++ b/planning/reports/Presentation1.pptx
@@ -5900,19 +5900,10 @@
                 </a:solidFill>
                 <a:sym typeface="Wingdings" pitchFamily="2" charset="2"/>
               </a:rPr>
-              <a:t>	</a:t>
-            </a:r>
-            <a:r>
-              <a:rPr lang="nb-NO" sz="3900">
-                <a:solidFill>
-                  <a:schemeClr val="bg1"/>
-                </a:solidFill>
-                <a:sym typeface="Wingdings" pitchFamily="2" charset="2"/>
-              </a:rPr>
-              <a:t>	                                               </a:t>
-            </a:r>
-            <a:r>
-              <a:rPr lang="nb-NO" sz="1800">
+              <a:t>		                                               </a:t>
+            </a:r>
+            <a:r>
+              <a:rPr lang="nb-NO" sz="1800" dirty="0" err="1">
                 <a:solidFill>
                   <a:schemeClr val="bg1"/>
                 </a:solidFill>

</xml_diff>

<commit_message>
before running to hell
</commit_message>
<xml_diff>
--- a/planning/reports/Presentation1.pptx
+++ b/planning/reports/Presentation1.pptx
@@ -6,12 +6,15 @@
   </p:sldMasterIdLst>
   <p:sldIdLst>
     <p:sldId id="256" r:id="rId2"/>
-    <p:sldId id="259" r:id="rId3"/>
-    <p:sldId id="257" r:id="rId4"/>
-    <p:sldId id="260" r:id="rId5"/>
-    <p:sldId id="261" r:id="rId6"/>
-    <p:sldId id="262" r:id="rId7"/>
-    <p:sldId id="258" r:id="rId8"/>
+    <p:sldId id="257" r:id="rId3"/>
+    <p:sldId id="263" r:id="rId4"/>
+    <p:sldId id="264" r:id="rId5"/>
+    <p:sldId id="265" r:id="rId6"/>
+    <p:sldId id="260" r:id="rId7"/>
+    <p:sldId id="259" r:id="rId8"/>
+    <p:sldId id="261" r:id="rId9"/>
+    <p:sldId id="262" r:id="rId10"/>
+    <p:sldId id="258" r:id="rId11"/>
   </p:sldIdLst>
   <p:sldSz cx="12192000" cy="6858000"/>
   <p:notesSz cx="6858000" cy="9144000"/>
@@ -110,6 +113,11 @@
       </a:defRPr>
     </a:lvl9pPr>
   </p:defaultTextStyle>
+  <p:extLst>
+    <p:ext uri="{EFAFB233-063F-42B5-8137-9DF3F51BA10A}">
+      <p15:sldGuideLst xmlns:p15="http://schemas.microsoft.com/office/powerpoint/2012/main"/>
+    </p:ext>
+  </p:extLst>
 </p:presentation>
 </file>
 
@@ -262,7 +270,7 @@
           <a:p>
             <a:fld id="{019AEAF4-3C75-494E-9E84-E95F1706BEED}" type="datetimeFigureOut">
               <a:rPr lang="nb-NO" smtClean="0"/>
-              <a:t>09.12.2019</a:t>
+              <a:t>12.12.2019</a:t>
             </a:fld>
             <a:endParaRPr lang="nb-NO"/>
           </a:p>
@@ -462,7 +470,7 @@
           <a:p>
             <a:fld id="{019AEAF4-3C75-494E-9E84-E95F1706BEED}" type="datetimeFigureOut">
               <a:rPr lang="nb-NO" smtClean="0"/>
-              <a:t>09.12.2019</a:t>
+              <a:t>12.12.2019</a:t>
             </a:fld>
             <a:endParaRPr lang="nb-NO"/>
           </a:p>
@@ -672,7 +680,7 @@
           <a:p>
             <a:fld id="{019AEAF4-3C75-494E-9E84-E95F1706BEED}" type="datetimeFigureOut">
               <a:rPr lang="nb-NO" smtClean="0"/>
-              <a:t>09.12.2019</a:t>
+              <a:t>12.12.2019</a:t>
             </a:fld>
             <a:endParaRPr lang="nb-NO"/>
           </a:p>
@@ -872,7 +880,7 @@
           <a:p>
             <a:fld id="{019AEAF4-3C75-494E-9E84-E95F1706BEED}" type="datetimeFigureOut">
               <a:rPr lang="nb-NO" smtClean="0"/>
-              <a:t>09.12.2019</a:t>
+              <a:t>12.12.2019</a:t>
             </a:fld>
             <a:endParaRPr lang="nb-NO"/>
           </a:p>
@@ -1148,7 +1156,7 @@
           <a:p>
             <a:fld id="{019AEAF4-3C75-494E-9E84-E95F1706BEED}" type="datetimeFigureOut">
               <a:rPr lang="nb-NO" smtClean="0"/>
-              <a:t>09.12.2019</a:t>
+              <a:t>12.12.2019</a:t>
             </a:fld>
             <a:endParaRPr lang="nb-NO"/>
           </a:p>
@@ -1416,7 +1424,7 @@
           <a:p>
             <a:fld id="{019AEAF4-3C75-494E-9E84-E95F1706BEED}" type="datetimeFigureOut">
               <a:rPr lang="nb-NO" smtClean="0"/>
-              <a:t>09.12.2019</a:t>
+              <a:t>12.12.2019</a:t>
             </a:fld>
             <a:endParaRPr lang="nb-NO"/>
           </a:p>
@@ -1831,7 +1839,7 @@
           <a:p>
             <a:fld id="{019AEAF4-3C75-494E-9E84-E95F1706BEED}" type="datetimeFigureOut">
               <a:rPr lang="nb-NO" smtClean="0"/>
-              <a:t>09.12.2019</a:t>
+              <a:t>12.12.2019</a:t>
             </a:fld>
             <a:endParaRPr lang="nb-NO"/>
           </a:p>
@@ -1973,7 +1981,7 @@
           <a:p>
             <a:fld id="{019AEAF4-3C75-494E-9E84-E95F1706BEED}" type="datetimeFigureOut">
               <a:rPr lang="nb-NO" smtClean="0"/>
-              <a:t>09.12.2019</a:t>
+              <a:t>12.12.2019</a:t>
             </a:fld>
             <a:endParaRPr lang="nb-NO"/>
           </a:p>
@@ -2086,7 +2094,7 @@
           <a:p>
             <a:fld id="{019AEAF4-3C75-494E-9E84-E95F1706BEED}" type="datetimeFigureOut">
               <a:rPr lang="nb-NO" smtClean="0"/>
-              <a:t>09.12.2019</a:t>
+              <a:t>12.12.2019</a:t>
             </a:fld>
             <a:endParaRPr lang="nb-NO"/>
           </a:p>
@@ -2399,7 +2407,7 @@
           <a:p>
             <a:fld id="{019AEAF4-3C75-494E-9E84-E95F1706BEED}" type="datetimeFigureOut">
               <a:rPr lang="nb-NO" smtClean="0"/>
-              <a:t>09.12.2019</a:t>
+              <a:t>12.12.2019</a:t>
             </a:fld>
             <a:endParaRPr lang="nb-NO"/>
           </a:p>
@@ -2688,7 +2696,7 @@
           <a:p>
             <a:fld id="{019AEAF4-3C75-494E-9E84-E95F1706BEED}" type="datetimeFigureOut">
               <a:rPr lang="nb-NO" smtClean="0"/>
-              <a:t>09.12.2019</a:t>
+              <a:t>12.12.2019</a:t>
             </a:fld>
             <a:endParaRPr lang="nb-NO"/>
           </a:p>
@@ -2931,7 +2939,7 @@
           <a:p>
             <a:fld id="{019AEAF4-3C75-494E-9E84-E95F1706BEED}" type="datetimeFigureOut">
               <a:rPr lang="nb-NO" smtClean="0"/>
-              <a:t>09.12.2019</a:t>
+              <a:t>12.12.2019</a:t>
             </a:fld>
             <a:endParaRPr lang="nb-NO"/>
           </a:p>
@@ -3551,20 +3559,6 @@
               <a:buChar char="•"/>
             </a:pPr>
             <a:r>
-              <a:rPr lang="nb-NO" dirty="0">
-                <a:solidFill>
-                  <a:schemeClr val="bg1"/>
-                </a:solidFill>
-              </a:rPr>
-              <a:t>Styletile</a:t>
-            </a:r>
-          </a:p>
-          <a:p>
-            <a:pPr marL="342900" indent="-342900" algn="just">
-              <a:buFont typeface="Arial" panose="020B0604020202020204" pitchFamily="34" charset="0"/>
-              <a:buChar char="•"/>
-            </a:pPr>
-            <a:r>
               <a:rPr lang="nb-NO" dirty="0" err="1">
                 <a:solidFill>
                   <a:schemeClr val="bg1"/>
@@ -3723,36 +3717,34 @@
               <a:buChar char="•"/>
             </a:pPr>
             <a:r>
+              <a:rPr lang="nb-NO" dirty="0">
+                <a:solidFill>
+                  <a:schemeClr val="bg1"/>
+                </a:solidFill>
+              </a:rPr>
+              <a:t>Styletile</a:t>
+            </a:r>
+          </a:p>
+          <a:p>
+            <a:pPr marL="342900" indent="-342900" algn="just">
+              <a:buFont typeface="Arial" panose="020B0604020202020204" pitchFamily="34" charset="0"/>
+              <a:buChar char="•"/>
+            </a:pPr>
+            <a:r>
               <a:rPr lang="nb-NO" dirty="0" err="1">
                 <a:solidFill>
                   <a:schemeClr val="bg1"/>
                 </a:solidFill>
               </a:rPr>
-              <a:t>Sketches</a:t>
-            </a:r>
-            <a:r>
-              <a:rPr lang="nb-NO" dirty="0">
-                <a:solidFill>
-                  <a:schemeClr val="bg1"/>
-                </a:solidFill>
-              </a:rPr>
-              <a:t>, </a:t>
-            </a:r>
-            <a:r>
-              <a:rPr lang="nb-NO" dirty="0" err="1">
-                <a:solidFill>
-                  <a:schemeClr val="bg1"/>
-                </a:solidFill>
-              </a:rPr>
-              <a:t>wireframes</a:t>
-            </a:r>
-            <a:r>
-              <a:rPr lang="nb-NO" dirty="0">
-                <a:solidFill>
-                  <a:schemeClr val="bg1"/>
-                </a:solidFill>
-              </a:rPr>
-              <a:t> and design</a:t>
+              <a:t>Sketchesand</a:t>
+            </a:r>
+            <a:r>
+              <a:rPr lang="nb-NO" dirty="0">
+                <a:solidFill>
+                  <a:schemeClr val="bg1"/>
+                </a:solidFill>
+              </a:rPr>
+              <a:t> design</a:t>
             </a:r>
           </a:p>
           <a:p>
@@ -3872,6 +3864,372 @@
 </p:sld>
 </file>
 
+<file path=ppt/slides/slide10.xml><?xml version="1.0" encoding="utf-8"?>
+<p:sld xmlns:a="http://schemas.openxmlformats.org/drawingml/2006/main" xmlns:r="http://schemas.openxmlformats.org/officeDocument/2006/relationships" xmlns:p="http://schemas.openxmlformats.org/presentationml/2006/main">
+  <p:cSld>
+    <p:spTree>
+      <p:nvGrpSpPr>
+        <p:cNvPr id="1" name=""/>
+        <p:cNvGrpSpPr/>
+        <p:nvPr/>
+      </p:nvGrpSpPr>
+      <p:grpSpPr>
+        <a:xfrm>
+          <a:off x="0" y="0"/>
+          <a:ext cx="0" cy="0"/>
+          <a:chOff x="0" y="0"/>
+          <a:chExt cx="0" cy="0"/>
+        </a:xfrm>
+      </p:grpSpPr>
+      <p:pic>
+        <p:nvPicPr>
+          <p:cNvPr id="5" name="Picture 4">
+            <a:extLst>
+              <a:ext uri="{FF2B5EF4-FFF2-40B4-BE49-F238E27FC236}">
+                <a16:creationId xmlns:a16="http://schemas.microsoft.com/office/drawing/2014/main" id="{39B5D36C-1CBF-1049-8A9D-782947C86446}"/>
+              </a:ext>
+            </a:extLst>
+          </p:cNvPr>
+          <p:cNvPicPr>
+            <a:picLocks noChangeAspect="1"/>
+          </p:cNvPicPr>
+          <p:nvPr/>
+        </p:nvPicPr>
+        <p:blipFill>
+          <a:blip r:embed="rId2"/>
+          <a:stretch>
+            <a:fillRect/>
+          </a:stretch>
+        </p:blipFill>
+        <p:spPr>
+          <a:xfrm>
+            <a:off x="0" y="0"/>
+            <a:ext cx="12192000" cy="6858000"/>
+          </a:xfrm>
+          <a:prstGeom prst="rect">
+            <a:avLst/>
+          </a:prstGeom>
+        </p:spPr>
+      </p:pic>
+      <p:sp>
+        <p:nvSpPr>
+          <p:cNvPr id="6" name="Rectangle 5">
+            <a:extLst>
+              <a:ext uri="{FF2B5EF4-FFF2-40B4-BE49-F238E27FC236}">
+                <a16:creationId xmlns:a16="http://schemas.microsoft.com/office/drawing/2014/main" id="{03B44277-5890-7348-BBE9-B18D4F242988}"/>
+              </a:ext>
+            </a:extLst>
+          </p:cNvPr>
+          <p:cNvSpPr/>
+          <p:nvPr/>
+        </p:nvSpPr>
+        <p:spPr>
+          <a:xfrm>
+            <a:off x="-1" y="0"/>
+            <a:ext cx="12191999" cy="6858000"/>
+          </a:xfrm>
+          <a:prstGeom prst="rect">
+            <a:avLst/>
+          </a:prstGeom>
+          <a:solidFill>
+            <a:schemeClr val="tx1">
+              <a:alpha val="43000"/>
+            </a:schemeClr>
+          </a:solidFill>
+          <a:ln>
+            <a:noFill/>
+          </a:ln>
+        </p:spPr>
+        <p:style>
+          <a:lnRef idx="2">
+            <a:schemeClr val="accent1">
+              <a:shade val="50000"/>
+            </a:schemeClr>
+          </a:lnRef>
+          <a:fillRef idx="1">
+            <a:schemeClr val="accent1"/>
+          </a:fillRef>
+          <a:effectRef idx="0">
+            <a:schemeClr val="accent1"/>
+          </a:effectRef>
+          <a:fontRef idx="minor">
+            <a:schemeClr val="lt1"/>
+          </a:fontRef>
+        </p:style>
+        <p:txBody>
+          <a:bodyPr rtlCol="0" anchor="ctr"/>
+          <a:lstStyle/>
+          <a:p>
+            <a:pPr algn="ctr"/>
+            <a:endParaRPr lang="en-US" dirty="0"/>
+          </a:p>
+        </p:txBody>
+      </p:sp>
+      <p:sp>
+        <p:nvSpPr>
+          <p:cNvPr id="2" name="Title 1">
+            <a:extLst>
+              <a:ext uri="{FF2B5EF4-FFF2-40B4-BE49-F238E27FC236}">
+                <a16:creationId xmlns:a16="http://schemas.microsoft.com/office/drawing/2014/main" id="{33AEF9F6-4647-2942-BA24-CCEAF054805D}"/>
+              </a:ext>
+            </a:extLst>
+          </p:cNvPr>
+          <p:cNvSpPr>
+            <a:spLocks noGrp="1"/>
+          </p:cNvSpPr>
+          <p:nvPr>
+            <p:ph type="title"/>
+          </p:nvPr>
+        </p:nvSpPr>
+        <p:spPr/>
+        <p:txBody>
+          <a:bodyPr/>
+          <a:lstStyle/>
+          <a:p>
+            <a:pPr algn="just"/>
+            <a:r>
+              <a:rPr lang="nb-NO" dirty="0">
+                <a:solidFill>
+                  <a:schemeClr val="bg1"/>
+                </a:solidFill>
+              </a:rPr>
+              <a:t>Q&amp;A</a:t>
+            </a:r>
+            <a:br>
+              <a:rPr lang="nb-NO" dirty="0">
+                <a:solidFill>
+                  <a:schemeClr val="bg1"/>
+                </a:solidFill>
+              </a:rPr>
+            </a:br>
+            <a:endParaRPr lang="nb-NO" dirty="0"/>
+          </a:p>
+        </p:txBody>
+      </p:sp>
+      <p:sp>
+        <p:nvSpPr>
+          <p:cNvPr id="3" name="Content Placeholder 2">
+            <a:extLst>
+              <a:ext uri="{FF2B5EF4-FFF2-40B4-BE49-F238E27FC236}">
+                <a16:creationId xmlns:a16="http://schemas.microsoft.com/office/drawing/2014/main" id="{C604B62E-7971-044E-85A4-11DD4A07F0D9}"/>
+              </a:ext>
+            </a:extLst>
+          </p:cNvPr>
+          <p:cNvSpPr>
+            <a:spLocks noGrp="1"/>
+          </p:cNvSpPr>
+          <p:nvPr>
+            <p:ph idx="1"/>
+          </p:nvPr>
+        </p:nvSpPr>
+        <p:spPr>
+          <a:xfrm>
+            <a:off x="838200" y="1130157"/>
+            <a:ext cx="10515600" cy="5568594"/>
+          </a:xfrm>
+        </p:spPr>
+        <p:txBody>
+          <a:bodyPr>
+            <a:normAutofit/>
+          </a:bodyPr>
+          <a:lstStyle/>
+          <a:p>
+            <a:pPr marL="0" indent="0">
+              <a:buNone/>
+            </a:pPr>
+            <a:endParaRPr lang="nb-NO" dirty="0">
+              <a:solidFill>
+                <a:schemeClr val="bg1"/>
+              </a:solidFill>
+            </a:endParaRPr>
+          </a:p>
+          <a:p>
+            <a:pPr marL="0" indent="0">
+              <a:buNone/>
+            </a:pPr>
+            <a:endParaRPr lang="nb-NO" dirty="0">
+              <a:solidFill>
+                <a:schemeClr val="bg1"/>
+              </a:solidFill>
+            </a:endParaRPr>
+          </a:p>
+          <a:p>
+            <a:pPr marL="0" indent="0" algn="ctr">
+              <a:buNone/>
+            </a:pPr>
+            <a:r>
+              <a:rPr lang="nb-NO" sz="3900" dirty="0" err="1">
+                <a:solidFill>
+                  <a:schemeClr val="bg1"/>
+                </a:solidFill>
+              </a:rPr>
+              <a:t>Any</a:t>
+            </a:r>
+            <a:r>
+              <a:rPr lang="nb-NO" sz="3900" dirty="0">
+                <a:solidFill>
+                  <a:schemeClr val="bg1"/>
+                </a:solidFill>
+              </a:rPr>
+              <a:t> Questions???</a:t>
+            </a:r>
+          </a:p>
+          <a:p>
+            <a:pPr marL="0" indent="0" algn="ctr">
+              <a:buNone/>
+            </a:pPr>
+            <a:endParaRPr lang="nb-NO" sz="3900" dirty="0">
+              <a:solidFill>
+                <a:schemeClr val="bg1"/>
+              </a:solidFill>
+            </a:endParaRPr>
+          </a:p>
+          <a:p>
+            <a:pPr marL="0" indent="0" algn="ctr">
+              <a:buNone/>
+            </a:pPr>
+            <a:r>
+              <a:rPr lang="nb-NO" sz="3900" dirty="0" err="1">
+                <a:solidFill>
+                  <a:schemeClr val="bg1"/>
+                </a:solidFill>
+              </a:rPr>
+              <a:t>Thank</a:t>
+            </a:r>
+            <a:r>
+              <a:rPr lang="nb-NO" sz="3900" dirty="0">
+                <a:solidFill>
+                  <a:schemeClr val="bg1"/>
+                </a:solidFill>
+              </a:rPr>
+              <a:t> </a:t>
+            </a:r>
+            <a:r>
+              <a:rPr lang="nb-NO" sz="3900" dirty="0" err="1">
+                <a:solidFill>
+                  <a:schemeClr val="bg1"/>
+                </a:solidFill>
+              </a:rPr>
+              <a:t>you</a:t>
+            </a:r>
+            <a:r>
+              <a:rPr lang="nb-NO" sz="3900" dirty="0">
+                <a:solidFill>
+                  <a:schemeClr val="bg1"/>
+                </a:solidFill>
+              </a:rPr>
+              <a:t> all for </a:t>
+            </a:r>
+            <a:r>
+              <a:rPr lang="nb-NO" sz="3900" dirty="0" err="1">
+                <a:solidFill>
+                  <a:schemeClr val="bg1"/>
+                </a:solidFill>
+              </a:rPr>
+              <a:t>your</a:t>
+            </a:r>
+            <a:r>
+              <a:rPr lang="nb-NO" sz="3900" dirty="0">
+                <a:solidFill>
+                  <a:schemeClr val="bg1"/>
+                </a:solidFill>
+              </a:rPr>
+              <a:t> time and </a:t>
+            </a:r>
+            <a:r>
+              <a:rPr lang="nb-NO" sz="3900" dirty="0" err="1">
+                <a:solidFill>
+                  <a:schemeClr val="bg1"/>
+                </a:solidFill>
+              </a:rPr>
+              <a:t>patience</a:t>
+            </a:r>
+            <a:r>
+              <a:rPr lang="nb-NO" sz="3900" dirty="0">
+                <a:solidFill>
+                  <a:schemeClr val="bg1"/>
+                </a:solidFill>
+              </a:rPr>
+              <a:t>. </a:t>
+            </a:r>
+          </a:p>
+          <a:p>
+            <a:pPr marL="0" indent="0" algn="ctr">
+              <a:buNone/>
+            </a:pPr>
+            <a:r>
+              <a:rPr lang="nb-NO" sz="3900" dirty="0">
+                <a:solidFill>
+                  <a:schemeClr val="bg1"/>
+                </a:solidFill>
+              </a:rPr>
+              <a:t>Happy Hollidays! </a:t>
+            </a:r>
+            <a:r>
+              <a:rPr lang="nb-NO" sz="3900" dirty="0">
+                <a:solidFill>
+                  <a:schemeClr val="bg1"/>
+                </a:solidFill>
+                <a:sym typeface="Wingdings" pitchFamily="2" charset="2"/>
+              </a:rPr>
+              <a:t></a:t>
+            </a:r>
+          </a:p>
+          <a:p>
+            <a:pPr marL="0" indent="0">
+              <a:buNone/>
+            </a:pPr>
+            <a:r>
+              <a:rPr lang="nb-NO" sz="3900" dirty="0">
+                <a:solidFill>
+                  <a:schemeClr val="bg1"/>
+                </a:solidFill>
+                <a:sym typeface="Wingdings" pitchFamily="2" charset="2"/>
+              </a:rPr>
+              <a:t>		                                               </a:t>
+            </a:r>
+            <a:r>
+              <a:rPr lang="nb-NO" sz="1800" dirty="0" err="1">
+                <a:solidFill>
+                  <a:schemeClr val="bg1"/>
+                </a:solidFill>
+              </a:rPr>
+              <a:t>Created</a:t>
+            </a:r>
+            <a:r>
+              <a:rPr lang="nb-NO" sz="1800" dirty="0">
+                <a:solidFill>
+                  <a:schemeClr val="bg1"/>
+                </a:solidFill>
+              </a:rPr>
+              <a:t> By Filip Nordhagen</a:t>
+            </a:r>
+          </a:p>
+          <a:p>
+            <a:pPr marL="0" indent="0" algn="ctr">
+              <a:buNone/>
+            </a:pPr>
+            <a:endParaRPr lang="nb-NO" sz="3900" dirty="0">
+              <a:solidFill>
+                <a:schemeClr val="bg1"/>
+              </a:solidFill>
+            </a:endParaRPr>
+          </a:p>
+        </p:txBody>
+      </p:sp>
+    </p:spTree>
+    <p:extLst>
+      <p:ext uri="{BB962C8B-B14F-4D97-AF65-F5344CB8AC3E}">
+        <p14:creationId xmlns:p14="http://schemas.microsoft.com/office/powerpoint/2010/main" val="332550349"/>
+      </p:ext>
+    </p:extLst>
+  </p:cSld>
+  <p:clrMapOvr>
+    <a:masterClrMapping/>
+  </p:clrMapOvr>
+</p:sld>
+</file>
+
 <file path=ppt/slides/slide2.xml><?xml version="1.0" encoding="utf-8"?>
 <p:sld xmlns:a="http://schemas.openxmlformats.org/drawingml/2006/main" xmlns:r="http://schemas.openxmlformats.org/officeDocument/2006/relationships" xmlns:p="http://schemas.openxmlformats.org/presentationml/2006/main">
   <p:cSld>
@@ -3891,10 +4249,10 @@
       </p:grpSpPr>
       <p:pic>
         <p:nvPicPr>
-          <p:cNvPr id="4" name="Picture 2">
-            <a:extLst>
-              <a:ext uri="{FF2B5EF4-FFF2-40B4-BE49-F238E27FC236}">
-                <a16:creationId xmlns:a16="http://schemas.microsoft.com/office/drawing/2014/main" id="{4A4F927E-3113-054C-B2A5-C48DFA5B266D}"/>
+          <p:cNvPr id="5" name="Picture 4">
+            <a:extLst>
+              <a:ext uri="{FF2B5EF4-FFF2-40B4-BE49-F238E27FC236}">
+                <a16:creationId xmlns:a16="http://schemas.microsoft.com/office/drawing/2014/main" id="{2270B49D-15F6-A843-AB08-6902C021442A}"/>
               </a:ext>
             </a:extLst>
           </p:cNvPr>
@@ -3910,7 +4268,7 @@
           </a:stretch>
         </p:blipFill>
         <p:spPr>
-          <a:xfrm flipH="1">
+          <a:xfrm>
             <a:off x="0" y="0"/>
             <a:ext cx="12192000" cy="6858000"/>
           </a:xfrm>
@@ -3924,7 +4282,7 @@
           <p:cNvPr id="6" name="Rectangle 5">
             <a:extLst>
               <a:ext uri="{FF2B5EF4-FFF2-40B4-BE49-F238E27FC236}">
-                <a16:creationId xmlns:a16="http://schemas.microsoft.com/office/drawing/2014/main" id="{32720EE7-F122-684E-A639-9CA8D722242D}"/>
+                <a16:creationId xmlns:a16="http://schemas.microsoft.com/office/drawing/2014/main" id="{F5E4AF25-A7E8-FF46-9275-F7C186045F1F}"/>
               </a:ext>
             </a:extLst>
           </p:cNvPr>
@@ -3978,7 +4336,7 @@
           <p:cNvPr id="2" name="Title 1">
             <a:extLst>
               <a:ext uri="{FF2B5EF4-FFF2-40B4-BE49-F238E27FC236}">
-                <a16:creationId xmlns:a16="http://schemas.microsoft.com/office/drawing/2014/main" id="{E3A0B983-E171-054F-AB80-7A29721A09E4}"/>
+                <a16:creationId xmlns:a16="http://schemas.microsoft.com/office/drawing/2014/main" id="{FE3EFCAC-F830-BE41-BEAC-BBD0CC1C4474}"/>
               </a:ext>
             </a:extLst>
           </p:cNvPr>
@@ -3995,13 +4353,85 @@
           <a:lstStyle/>
           <a:p>
             <a:r>
-              <a:rPr lang="nb-NO" dirty="0">
-                <a:solidFill>
-                  <a:schemeClr val="bg1"/>
-                </a:solidFill>
-              </a:rPr>
-              <a:t>Styletile:</a:t>
-            </a:r>
+              <a:rPr lang="nb-NO" dirty="0" err="1">
+                <a:solidFill>
+                  <a:schemeClr val="bg1"/>
+                </a:solidFill>
+              </a:rPr>
+              <a:t>Themes</a:t>
+            </a:r>
+            <a:r>
+              <a:rPr lang="nb-NO" dirty="0">
+                <a:solidFill>
+                  <a:schemeClr val="bg1"/>
+                </a:solidFill>
+              </a:rPr>
+              <a:t>, </a:t>
+            </a:r>
+            <a:r>
+              <a:rPr lang="nb-NO" dirty="0" err="1">
+                <a:solidFill>
+                  <a:schemeClr val="bg1"/>
+                </a:solidFill>
+              </a:rPr>
+              <a:t>epics</a:t>
+            </a:r>
+            <a:r>
+              <a:rPr lang="nb-NO" dirty="0">
+                <a:solidFill>
+                  <a:schemeClr val="bg1"/>
+                </a:solidFill>
+              </a:rPr>
+              <a:t>, </a:t>
+            </a:r>
+            <a:r>
+              <a:rPr lang="nb-NO" dirty="0" err="1">
+                <a:solidFill>
+                  <a:schemeClr val="bg1"/>
+                </a:solidFill>
+              </a:rPr>
+              <a:t>features</a:t>
+            </a:r>
+            <a:r>
+              <a:rPr lang="nb-NO" dirty="0">
+                <a:solidFill>
+                  <a:schemeClr val="bg1"/>
+                </a:solidFill>
+              </a:rPr>
+              <a:t>, </a:t>
+            </a:r>
+            <a:r>
+              <a:rPr lang="nb-NO" dirty="0" err="1">
+                <a:solidFill>
+                  <a:schemeClr val="bg1"/>
+                </a:solidFill>
+              </a:rPr>
+              <a:t>user</a:t>
+            </a:r>
+            <a:r>
+              <a:rPr lang="nb-NO" dirty="0">
+                <a:solidFill>
+                  <a:schemeClr val="bg1"/>
+                </a:solidFill>
+              </a:rPr>
+              <a:t> </a:t>
+            </a:r>
+            <a:r>
+              <a:rPr lang="nb-NO" dirty="0" err="1">
+                <a:solidFill>
+                  <a:schemeClr val="bg1"/>
+                </a:solidFill>
+              </a:rPr>
+              <a:t>stories</a:t>
+            </a:r>
+            <a:br>
+              <a:rPr lang="nb-NO" dirty="0">
+                <a:solidFill>
+                  <a:schemeClr val="bg1"/>
+                </a:solidFill>
+              </a:rPr>
+            </a:br>
+            <a:endParaRPr lang="nb-NO" dirty="0"/>
           </a:p>
         </p:txBody>
       </p:sp>
@@ -4010,7 +4440,7 @@
           <p:cNvPr id="3" name="Content Placeholder 2">
             <a:extLst>
               <a:ext uri="{FF2B5EF4-FFF2-40B4-BE49-F238E27FC236}">
-                <a16:creationId xmlns:a16="http://schemas.microsoft.com/office/drawing/2014/main" id="{4C5A656F-E6FB-F546-928A-3E27CCE9EA2C}"/>
+                <a16:creationId xmlns:a16="http://schemas.microsoft.com/office/drawing/2014/main" id="{964288EC-5A05-AE43-8273-581F82B296B7}"/>
               </a:ext>
             </a:extLst>
           </p:cNvPr>
@@ -4021,68 +4451,80 @@
             <p:ph idx="1"/>
           </p:nvPr>
         </p:nvSpPr>
-        <p:spPr/>
+        <p:spPr>
+          <a:xfrm>
+            <a:off x="2584806" y="1558497"/>
+            <a:ext cx="4720119" cy="4351338"/>
+          </a:xfrm>
+        </p:spPr>
         <p:txBody>
           <a:bodyPr/>
           <a:lstStyle/>
           <a:p>
-            <a:r>
-              <a:rPr lang="nb-NO" dirty="0">
-                <a:solidFill>
-                  <a:schemeClr val="bg1"/>
-                </a:solidFill>
-              </a:rPr>
-              <a:t>Fonts used</a:t>
-            </a:r>
-          </a:p>
-          <a:p>
-            <a:r>
-              <a:rPr lang="nb-NO" dirty="0">
-                <a:solidFill>
-                  <a:schemeClr val="bg1"/>
-                </a:solidFill>
-              </a:rPr>
-              <a:t>Buttons</a:t>
-            </a:r>
-          </a:p>
-          <a:p>
-            <a:r>
-              <a:rPr lang="nb-NO" dirty="0">
-                <a:solidFill>
-                  <a:schemeClr val="bg1"/>
-                </a:solidFill>
-              </a:rPr>
-              <a:t>Logos</a:t>
-            </a:r>
-          </a:p>
-          <a:p>
-            <a:r>
-              <a:rPr lang="nb-NO" dirty="0">
-                <a:solidFill>
-                  <a:schemeClr val="bg1"/>
-                </a:solidFill>
-              </a:rPr>
-              <a:t>Graphics</a:t>
-            </a:r>
-          </a:p>
-          <a:p>
-            <a:r>
-              <a:rPr lang="nb-NO" dirty="0">
-                <a:solidFill>
-                  <a:schemeClr val="bg1"/>
-                </a:solidFill>
-              </a:rPr>
-              <a:t>Pictures</a:t>
-            </a:r>
-          </a:p>
-          <a:p>
+            <a:pPr marL="0" indent="0">
+              <a:buNone/>
+            </a:pPr>
             <a:r>
               <a:rPr lang="nb-NO" dirty="0" err="1">
                 <a:solidFill>
                   <a:schemeClr val="bg1"/>
                 </a:solidFill>
               </a:rPr>
-              <a:t>Colour-schemes</a:t>
+              <a:t>Why</a:t>
+            </a:r>
+            <a:r>
+              <a:rPr lang="nb-NO" dirty="0">
+                <a:solidFill>
+                  <a:schemeClr val="bg1"/>
+                </a:solidFill>
+              </a:rPr>
+              <a:t> I </a:t>
+            </a:r>
+            <a:r>
+              <a:rPr lang="nb-NO" dirty="0" err="1">
+                <a:solidFill>
+                  <a:schemeClr val="bg1"/>
+                </a:solidFill>
+              </a:rPr>
+              <a:t>chose</a:t>
+            </a:r>
+            <a:r>
+              <a:rPr lang="nb-NO" dirty="0">
+                <a:solidFill>
+                  <a:schemeClr val="bg1"/>
+                </a:solidFill>
+              </a:rPr>
+              <a:t> </a:t>
+            </a:r>
+            <a:r>
+              <a:rPr lang="nb-NO" dirty="0" err="1">
+                <a:solidFill>
+                  <a:schemeClr val="bg1"/>
+                </a:solidFill>
+              </a:rPr>
+              <a:t>the</a:t>
+            </a:r>
+            <a:r>
+              <a:rPr lang="nb-NO" dirty="0">
+                <a:solidFill>
+                  <a:schemeClr val="bg1"/>
+                </a:solidFill>
+              </a:rPr>
+              <a:t> different </a:t>
+            </a:r>
+          </a:p>
+          <a:p>
+            <a:pPr>
+              <a:buFont typeface="Wingdings" pitchFamily="2" charset="2"/>
+              <a:buChar char="v"/>
+            </a:pPr>
+            <a:r>
+              <a:rPr lang="nb-NO" dirty="0" err="1">
+                <a:solidFill>
+                  <a:schemeClr val="bg1"/>
+                </a:solidFill>
+              </a:rPr>
+              <a:t>Themes</a:t>
             </a:r>
             <a:endParaRPr lang="nb-NO" dirty="0">
               <a:solidFill>
@@ -4091,17 +4533,76 @@
             </a:endParaRPr>
           </a:p>
           <a:p>
-            <a:endParaRPr lang="nb-NO" dirty="0"/>
-          </a:p>
-          <a:p>
-            <a:endParaRPr lang="nb-NO" dirty="0"/>
+            <a:pPr>
+              <a:buFont typeface="Wingdings" pitchFamily="2" charset="2"/>
+              <a:buChar char="v"/>
+            </a:pPr>
+            <a:r>
+              <a:rPr lang="nb-NO" dirty="0" err="1">
+                <a:solidFill>
+                  <a:schemeClr val="bg1"/>
+                </a:solidFill>
+              </a:rPr>
+              <a:t>Epics</a:t>
+            </a:r>
+            <a:endParaRPr lang="nb-NO" dirty="0">
+              <a:solidFill>
+                <a:schemeClr val="bg1"/>
+              </a:solidFill>
+            </a:endParaRPr>
+          </a:p>
+          <a:p>
+            <a:pPr>
+              <a:buFont typeface="Wingdings" pitchFamily="2" charset="2"/>
+              <a:buChar char="v"/>
+            </a:pPr>
+            <a:r>
+              <a:rPr lang="nb-NO" dirty="0" err="1">
+                <a:solidFill>
+                  <a:schemeClr val="bg1"/>
+                </a:solidFill>
+              </a:rPr>
+              <a:t>Features</a:t>
+            </a:r>
+            <a:endParaRPr lang="nb-NO" dirty="0">
+              <a:solidFill>
+                <a:schemeClr val="bg1"/>
+              </a:solidFill>
+            </a:endParaRPr>
+          </a:p>
+          <a:p>
+            <a:pPr>
+              <a:buFont typeface="Wingdings" pitchFamily="2" charset="2"/>
+              <a:buChar char="v"/>
+            </a:pPr>
+            <a:r>
+              <a:rPr lang="nb-NO" dirty="0">
+                <a:solidFill>
+                  <a:schemeClr val="bg1"/>
+                </a:solidFill>
+              </a:rPr>
+              <a:t>User </a:t>
+            </a:r>
+            <a:r>
+              <a:rPr lang="nb-NO" dirty="0" err="1">
+                <a:solidFill>
+                  <a:schemeClr val="bg1"/>
+                </a:solidFill>
+              </a:rPr>
+              <a:t>stories</a:t>
+            </a:r>
+            <a:endParaRPr lang="nb-NO" dirty="0">
+              <a:solidFill>
+                <a:schemeClr val="bg1"/>
+              </a:solidFill>
+            </a:endParaRPr>
           </a:p>
         </p:txBody>
       </p:sp>
     </p:spTree>
     <p:extLst>
       <p:ext uri="{BB962C8B-B14F-4D97-AF65-F5344CB8AC3E}">
-        <p14:creationId xmlns:p14="http://schemas.microsoft.com/office/powerpoint/2010/main" val="4009127440"/>
+        <p14:creationId xmlns:p14="http://schemas.microsoft.com/office/powerpoint/2010/main" val="2464846779"/>
       </p:ext>
     </p:extLst>
   </p:cSld>
@@ -4130,10 +4631,675 @@
       </p:grpSpPr>
       <p:pic>
         <p:nvPicPr>
-          <p:cNvPr id="5" name="Picture 4">
-            <a:extLst>
-              <a:ext uri="{FF2B5EF4-FFF2-40B4-BE49-F238E27FC236}">
-                <a16:creationId xmlns:a16="http://schemas.microsoft.com/office/drawing/2014/main" id="{2270B49D-15F6-A843-AB08-6902C021442A}"/>
+          <p:cNvPr id="5" name="Content Placeholder 4">
+            <a:extLst>
+              <a:ext uri="{FF2B5EF4-FFF2-40B4-BE49-F238E27FC236}">
+                <a16:creationId xmlns:a16="http://schemas.microsoft.com/office/drawing/2014/main" id="{67D282D7-98D6-2D49-A584-0470FF60CD70}"/>
+              </a:ext>
+            </a:extLst>
+          </p:cNvPr>
+          <p:cNvPicPr>
+            <a:picLocks noGrp="1" noChangeAspect="1"/>
+          </p:cNvPicPr>
+          <p:nvPr>
+            <p:ph idx="1"/>
+          </p:nvPr>
+        </p:nvPicPr>
+        <p:blipFill>
+          <a:blip r:embed="rId2"/>
+          <a:stretch>
+            <a:fillRect/>
+          </a:stretch>
+        </p:blipFill>
+        <p:spPr>
+          <a:xfrm>
+            <a:off x="0" y="1"/>
+            <a:ext cx="5142070" cy="6858000"/>
+          </a:xfrm>
+        </p:spPr>
+      </p:pic>
+    </p:spTree>
+    <p:extLst>
+      <p:ext uri="{BB962C8B-B14F-4D97-AF65-F5344CB8AC3E}">
+        <p14:creationId xmlns:p14="http://schemas.microsoft.com/office/powerpoint/2010/main" val="545181068"/>
+      </p:ext>
+    </p:extLst>
+  </p:cSld>
+  <p:clrMapOvr>
+    <a:masterClrMapping/>
+  </p:clrMapOvr>
+</p:sld>
+</file>
+
+<file path=ppt/slides/slide4.xml><?xml version="1.0" encoding="utf-8"?>
+<p:sld xmlns:a="http://schemas.openxmlformats.org/drawingml/2006/main" xmlns:r="http://schemas.openxmlformats.org/officeDocument/2006/relationships" xmlns:p="http://schemas.openxmlformats.org/presentationml/2006/main">
+  <p:cSld>
+    <p:spTree>
+      <p:nvGrpSpPr>
+        <p:cNvPr id="1" name=""/>
+        <p:cNvGrpSpPr/>
+        <p:nvPr/>
+      </p:nvGrpSpPr>
+      <p:grpSpPr>
+        <a:xfrm>
+          <a:off x="0" y="0"/>
+          <a:ext cx="0" cy="0"/>
+          <a:chOff x="0" y="0"/>
+          <a:chExt cx="0" cy="0"/>
+        </a:xfrm>
+      </p:grpSpPr>
+      <p:sp>
+        <p:nvSpPr>
+          <p:cNvPr id="2" name="Title 1">
+            <a:extLst>
+              <a:ext uri="{FF2B5EF4-FFF2-40B4-BE49-F238E27FC236}">
+                <a16:creationId xmlns:a16="http://schemas.microsoft.com/office/drawing/2014/main" id="{37B700E5-A5A6-DE41-A8BA-2AE6583BF17C}"/>
+              </a:ext>
+            </a:extLst>
+          </p:cNvPr>
+          <p:cNvSpPr>
+            <a:spLocks noGrp="1"/>
+          </p:cNvSpPr>
+          <p:nvPr>
+            <p:ph type="title"/>
+          </p:nvPr>
+        </p:nvSpPr>
+        <p:spPr/>
+        <p:txBody>
+          <a:bodyPr/>
+          <a:lstStyle/>
+          <a:p>
+            <a:endParaRPr lang="nb-NO"/>
+          </a:p>
+        </p:txBody>
+      </p:sp>
+      <p:sp>
+        <p:nvSpPr>
+          <p:cNvPr id="3" name="Content Placeholder 2">
+            <a:extLst>
+              <a:ext uri="{FF2B5EF4-FFF2-40B4-BE49-F238E27FC236}">
+                <a16:creationId xmlns:a16="http://schemas.microsoft.com/office/drawing/2014/main" id="{20D1A946-2A93-CD42-816A-1E6E45FBEF3D}"/>
+              </a:ext>
+            </a:extLst>
+          </p:cNvPr>
+          <p:cNvSpPr>
+            <a:spLocks noGrp="1"/>
+          </p:cNvSpPr>
+          <p:nvPr>
+            <p:ph idx="1"/>
+          </p:nvPr>
+        </p:nvSpPr>
+        <p:spPr/>
+        <p:txBody>
+          <a:bodyPr/>
+          <a:lstStyle/>
+          <a:p>
+            <a:endParaRPr lang="nb-NO"/>
+          </a:p>
+        </p:txBody>
+      </p:sp>
+    </p:spTree>
+    <p:extLst>
+      <p:ext uri="{BB962C8B-B14F-4D97-AF65-F5344CB8AC3E}">
+        <p14:creationId xmlns:p14="http://schemas.microsoft.com/office/powerpoint/2010/main" val="3880471857"/>
+      </p:ext>
+    </p:extLst>
+  </p:cSld>
+  <p:clrMapOvr>
+    <a:masterClrMapping/>
+  </p:clrMapOvr>
+</p:sld>
+</file>
+
+<file path=ppt/slides/slide5.xml><?xml version="1.0" encoding="utf-8"?>
+<p:sld xmlns:a="http://schemas.openxmlformats.org/drawingml/2006/main" xmlns:r="http://schemas.openxmlformats.org/officeDocument/2006/relationships" xmlns:p="http://schemas.openxmlformats.org/presentationml/2006/main">
+  <p:cSld>
+    <p:spTree>
+      <p:nvGrpSpPr>
+        <p:cNvPr id="1" name=""/>
+        <p:cNvGrpSpPr/>
+        <p:nvPr/>
+      </p:nvGrpSpPr>
+      <p:grpSpPr>
+        <a:xfrm>
+          <a:off x="0" y="0"/>
+          <a:ext cx="0" cy="0"/>
+          <a:chOff x="0" y="0"/>
+          <a:chExt cx="0" cy="0"/>
+        </a:xfrm>
+      </p:grpSpPr>
+      <p:sp>
+        <p:nvSpPr>
+          <p:cNvPr id="2" name="Title 1">
+            <a:extLst>
+              <a:ext uri="{FF2B5EF4-FFF2-40B4-BE49-F238E27FC236}">
+                <a16:creationId xmlns:a16="http://schemas.microsoft.com/office/drawing/2014/main" id="{11273512-2743-014F-97A1-E4C1C7398D1F}"/>
+              </a:ext>
+            </a:extLst>
+          </p:cNvPr>
+          <p:cNvSpPr>
+            <a:spLocks noGrp="1"/>
+          </p:cNvSpPr>
+          <p:nvPr>
+            <p:ph type="title"/>
+          </p:nvPr>
+        </p:nvSpPr>
+        <p:spPr/>
+        <p:txBody>
+          <a:bodyPr/>
+          <a:lstStyle/>
+          <a:p>
+            <a:endParaRPr lang="nb-NO"/>
+          </a:p>
+        </p:txBody>
+      </p:sp>
+      <p:sp>
+        <p:nvSpPr>
+          <p:cNvPr id="3" name="Content Placeholder 2">
+            <a:extLst>
+              <a:ext uri="{FF2B5EF4-FFF2-40B4-BE49-F238E27FC236}">
+                <a16:creationId xmlns:a16="http://schemas.microsoft.com/office/drawing/2014/main" id="{D2D9BA4D-280F-E44F-907F-0E45071AD962}"/>
+              </a:ext>
+            </a:extLst>
+          </p:cNvPr>
+          <p:cNvSpPr>
+            <a:spLocks noGrp="1"/>
+          </p:cNvSpPr>
+          <p:nvPr>
+            <p:ph idx="1"/>
+          </p:nvPr>
+        </p:nvSpPr>
+        <p:spPr/>
+        <p:txBody>
+          <a:bodyPr/>
+          <a:lstStyle/>
+          <a:p>
+            <a:endParaRPr lang="nb-NO"/>
+          </a:p>
+        </p:txBody>
+      </p:sp>
+    </p:spTree>
+    <p:extLst>
+      <p:ext uri="{BB962C8B-B14F-4D97-AF65-F5344CB8AC3E}">
+        <p14:creationId xmlns:p14="http://schemas.microsoft.com/office/powerpoint/2010/main" val="4152078217"/>
+      </p:ext>
+    </p:extLst>
+  </p:cSld>
+  <p:clrMapOvr>
+    <a:masterClrMapping/>
+  </p:clrMapOvr>
+</p:sld>
+</file>
+
+<file path=ppt/slides/slide6.xml><?xml version="1.0" encoding="utf-8"?>
+<p:sld xmlns:a="http://schemas.openxmlformats.org/drawingml/2006/main" xmlns:r="http://schemas.openxmlformats.org/officeDocument/2006/relationships" xmlns:p="http://schemas.openxmlformats.org/presentationml/2006/main">
+  <p:cSld>
+    <p:spTree>
+      <p:nvGrpSpPr>
+        <p:cNvPr id="1" name=""/>
+        <p:cNvGrpSpPr/>
+        <p:nvPr/>
+      </p:nvGrpSpPr>
+      <p:grpSpPr>
+        <a:xfrm>
+          <a:off x="0" y="0"/>
+          <a:ext cx="0" cy="0"/>
+          <a:chOff x="0" y="0"/>
+          <a:chExt cx="0" cy="0"/>
+        </a:xfrm>
+      </p:grpSpPr>
+      <p:pic>
+        <p:nvPicPr>
+          <p:cNvPr id="4" name="Picture 3">
+            <a:extLst>
+              <a:ext uri="{FF2B5EF4-FFF2-40B4-BE49-F238E27FC236}">
+                <a16:creationId xmlns:a16="http://schemas.microsoft.com/office/drawing/2014/main" id="{3B11CB68-BFCC-634D-A667-18DEBE043427}"/>
+              </a:ext>
+            </a:extLst>
+          </p:cNvPr>
+          <p:cNvPicPr>
+            <a:picLocks noChangeAspect="1"/>
+          </p:cNvPicPr>
+          <p:nvPr/>
+        </p:nvPicPr>
+        <p:blipFill rotWithShape="1">
+          <a:blip r:embed="rId2"/>
+          <a:srcRect t="6666"/>
+          <a:stretch/>
+        </p:blipFill>
+        <p:spPr>
+          <a:xfrm>
+            <a:off x="0" y="0"/>
+            <a:ext cx="12220546" cy="7140539"/>
+          </a:xfrm>
+          <a:prstGeom prst="rect">
+            <a:avLst/>
+          </a:prstGeom>
+        </p:spPr>
+      </p:pic>
+      <p:sp>
+        <p:nvSpPr>
+          <p:cNvPr id="5" name="Rectangle 4">
+            <a:extLst>
+              <a:ext uri="{FF2B5EF4-FFF2-40B4-BE49-F238E27FC236}">
+                <a16:creationId xmlns:a16="http://schemas.microsoft.com/office/drawing/2014/main" id="{C035E99D-8C70-A746-9315-4514378BBF25}"/>
+              </a:ext>
+            </a:extLst>
+          </p:cNvPr>
+          <p:cNvSpPr/>
+          <p:nvPr/>
+        </p:nvSpPr>
+        <p:spPr>
+          <a:xfrm>
+            <a:off x="0" y="0"/>
+            <a:ext cx="12209460" cy="7068620"/>
+          </a:xfrm>
+          <a:prstGeom prst="rect">
+            <a:avLst/>
+          </a:prstGeom>
+          <a:solidFill>
+            <a:schemeClr val="tx1">
+              <a:alpha val="43000"/>
+            </a:schemeClr>
+          </a:solidFill>
+          <a:ln>
+            <a:noFill/>
+          </a:ln>
+        </p:spPr>
+        <p:style>
+          <a:lnRef idx="2">
+            <a:schemeClr val="accent1">
+              <a:shade val="50000"/>
+            </a:schemeClr>
+          </a:lnRef>
+          <a:fillRef idx="1">
+            <a:schemeClr val="accent1"/>
+          </a:fillRef>
+          <a:effectRef idx="0">
+            <a:schemeClr val="accent1"/>
+          </a:effectRef>
+          <a:fontRef idx="minor">
+            <a:schemeClr val="lt1"/>
+          </a:fontRef>
+        </p:style>
+        <p:txBody>
+          <a:bodyPr rtlCol="0" anchor="ctr"/>
+          <a:lstStyle/>
+          <a:p>
+            <a:pPr algn="ctr"/>
+            <a:endParaRPr lang="en-US"/>
+          </a:p>
+        </p:txBody>
+      </p:sp>
+      <p:sp>
+        <p:nvSpPr>
+          <p:cNvPr id="2" name="Title 1">
+            <a:extLst>
+              <a:ext uri="{FF2B5EF4-FFF2-40B4-BE49-F238E27FC236}">
+                <a16:creationId xmlns:a16="http://schemas.microsoft.com/office/drawing/2014/main" id="{BCCEAD39-1FE4-5C44-9E5C-A8114FD20B4E}"/>
+              </a:ext>
+            </a:extLst>
+          </p:cNvPr>
+          <p:cNvSpPr>
+            <a:spLocks noGrp="1"/>
+          </p:cNvSpPr>
+          <p:nvPr>
+            <p:ph type="title"/>
+          </p:nvPr>
+        </p:nvSpPr>
+        <p:spPr/>
+        <p:txBody>
+          <a:bodyPr/>
+          <a:lstStyle/>
+          <a:p>
+            <a:r>
+              <a:rPr lang="nb-NO" dirty="0">
+                <a:solidFill>
+                  <a:schemeClr val="bg1"/>
+                </a:solidFill>
+              </a:rPr>
+              <a:t>Scope </a:t>
+            </a:r>
+            <a:r>
+              <a:rPr lang="nb-NO" dirty="0" err="1">
+                <a:solidFill>
+                  <a:schemeClr val="bg1"/>
+                </a:solidFill>
+              </a:rPr>
+              <a:t>of</a:t>
+            </a:r>
+            <a:r>
+              <a:rPr lang="nb-NO" dirty="0">
+                <a:solidFill>
+                  <a:schemeClr val="bg1"/>
+                </a:solidFill>
+              </a:rPr>
+              <a:t> </a:t>
+            </a:r>
+            <a:r>
+              <a:rPr lang="nb-NO" dirty="0" err="1">
+                <a:solidFill>
+                  <a:schemeClr val="bg1"/>
+                </a:solidFill>
+              </a:rPr>
+              <a:t>Work</a:t>
+            </a:r>
+            <a:r>
+              <a:rPr lang="nb-NO" dirty="0">
+                <a:solidFill>
+                  <a:schemeClr val="bg1"/>
+                </a:solidFill>
+              </a:rPr>
+              <a:t> and </a:t>
+            </a:r>
+            <a:r>
+              <a:rPr lang="nb-NO" dirty="0" err="1">
+                <a:solidFill>
+                  <a:schemeClr val="bg1"/>
+                </a:solidFill>
+              </a:rPr>
+              <a:t>Gantt</a:t>
+            </a:r>
+            <a:r>
+              <a:rPr lang="nb-NO" dirty="0">
+                <a:solidFill>
+                  <a:schemeClr val="bg1"/>
+                </a:solidFill>
+              </a:rPr>
+              <a:t> </a:t>
+            </a:r>
+            <a:r>
+              <a:rPr lang="nb-NO" dirty="0" err="1">
+                <a:solidFill>
+                  <a:schemeClr val="bg1"/>
+                </a:solidFill>
+              </a:rPr>
+              <a:t>chart</a:t>
+            </a:r>
+            <a:br>
+              <a:rPr lang="nb-NO" dirty="0">
+                <a:solidFill>
+                  <a:schemeClr val="bg1"/>
+                </a:solidFill>
+              </a:rPr>
+            </a:br>
+            <a:endParaRPr lang="nb-NO" dirty="0"/>
+          </a:p>
+        </p:txBody>
+      </p:sp>
+      <p:sp>
+        <p:nvSpPr>
+          <p:cNvPr id="3" name="Content Placeholder 2">
+            <a:extLst>
+              <a:ext uri="{FF2B5EF4-FFF2-40B4-BE49-F238E27FC236}">
+                <a16:creationId xmlns:a16="http://schemas.microsoft.com/office/drawing/2014/main" id="{EF480F7C-ACFA-A24A-9DB4-2C4D40A03809}"/>
+              </a:ext>
+            </a:extLst>
+          </p:cNvPr>
+          <p:cNvSpPr>
+            <a:spLocks noGrp="1"/>
+          </p:cNvSpPr>
+          <p:nvPr>
+            <p:ph idx="1"/>
+          </p:nvPr>
+        </p:nvSpPr>
+        <p:spPr>
+          <a:xfrm>
+            <a:off x="2256034" y="1507126"/>
+            <a:ext cx="6209872" cy="4351338"/>
+          </a:xfrm>
+        </p:spPr>
+        <p:txBody>
+          <a:bodyPr/>
+          <a:lstStyle/>
+          <a:p>
+            <a:r>
+              <a:rPr lang="nb-NO" dirty="0">
+                <a:solidFill>
+                  <a:schemeClr val="bg1"/>
+                </a:solidFill>
+              </a:rPr>
+              <a:t>Present Scope </a:t>
+            </a:r>
+            <a:r>
+              <a:rPr lang="nb-NO" dirty="0" err="1">
+                <a:solidFill>
+                  <a:schemeClr val="bg1"/>
+                </a:solidFill>
+              </a:rPr>
+              <a:t>of</a:t>
+            </a:r>
+            <a:r>
+              <a:rPr lang="nb-NO" dirty="0">
+                <a:solidFill>
+                  <a:schemeClr val="bg1"/>
+                </a:solidFill>
+              </a:rPr>
+              <a:t> </a:t>
+            </a:r>
+            <a:r>
+              <a:rPr lang="nb-NO" dirty="0" err="1">
+                <a:solidFill>
+                  <a:schemeClr val="bg1"/>
+                </a:solidFill>
+              </a:rPr>
+              <a:t>work</a:t>
+            </a:r>
+            <a:r>
+              <a:rPr lang="nb-NO" dirty="0">
+                <a:solidFill>
+                  <a:schemeClr val="bg1"/>
+                </a:solidFill>
+              </a:rPr>
+              <a:t> rev 1A</a:t>
+            </a:r>
+          </a:p>
+          <a:p>
+            <a:r>
+              <a:rPr lang="nb-NO" dirty="0">
+                <a:solidFill>
+                  <a:schemeClr val="bg1"/>
+                </a:solidFill>
+              </a:rPr>
+              <a:t>Present </a:t>
+            </a:r>
+            <a:r>
+              <a:rPr lang="nb-NO" dirty="0" err="1">
+                <a:solidFill>
+                  <a:schemeClr val="bg1"/>
+                </a:solidFill>
+              </a:rPr>
+              <a:t>Gantt</a:t>
+            </a:r>
+            <a:r>
+              <a:rPr lang="nb-NO" dirty="0">
+                <a:solidFill>
+                  <a:schemeClr val="bg1"/>
+                </a:solidFill>
+              </a:rPr>
+              <a:t> </a:t>
+            </a:r>
+            <a:r>
+              <a:rPr lang="nb-NO" dirty="0" err="1">
+                <a:solidFill>
+                  <a:schemeClr val="bg1"/>
+                </a:solidFill>
+              </a:rPr>
+              <a:t>chart</a:t>
+            </a:r>
+            <a:r>
+              <a:rPr lang="nb-NO" dirty="0">
+                <a:solidFill>
+                  <a:schemeClr val="bg1"/>
+                </a:solidFill>
+              </a:rPr>
+              <a:t> rev 1A</a:t>
+            </a:r>
+          </a:p>
+          <a:p>
+            <a:r>
+              <a:rPr lang="nb-NO" dirty="0">
+                <a:solidFill>
+                  <a:schemeClr val="bg1"/>
+                </a:solidFill>
+              </a:rPr>
+              <a:t>Present </a:t>
+            </a:r>
+            <a:r>
+              <a:rPr lang="nb-NO" dirty="0" err="1">
+                <a:solidFill>
+                  <a:schemeClr val="bg1"/>
+                </a:solidFill>
+              </a:rPr>
+              <a:t>Gantt</a:t>
+            </a:r>
+            <a:r>
+              <a:rPr lang="nb-NO" dirty="0">
+                <a:solidFill>
+                  <a:schemeClr val="bg1"/>
+                </a:solidFill>
+              </a:rPr>
+              <a:t> </a:t>
+            </a:r>
+            <a:r>
+              <a:rPr lang="nb-NO" dirty="0" err="1">
+                <a:solidFill>
+                  <a:schemeClr val="bg1"/>
+                </a:solidFill>
+              </a:rPr>
+              <a:t>chart</a:t>
+            </a:r>
+            <a:r>
+              <a:rPr lang="nb-NO" dirty="0">
+                <a:solidFill>
+                  <a:schemeClr val="bg1"/>
+                </a:solidFill>
+              </a:rPr>
+              <a:t> rev 2A</a:t>
+            </a:r>
+          </a:p>
+          <a:p>
+            <a:r>
+              <a:rPr lang="nb-NO" dirty="0" err="1">
+                <a:solidFill>
+                  <a:schemeClr val="bg1"/>
+                </a:solidFill>
+              </a:rPr>
+              <a:t>What</a:t>
+            </a:r>
+            <a:r>
+              <a:rPr lang="nb-NO" dirty="0">
+                <a:solidFill>
+                  <a:schemeClr val="bg1"/>
+                </a:solidFill>
+              </a:rPr>
+              <a:t> I </a:t>
+            </a:r>
+            <a:r>
+              <a:rPr lang="nb-NO" dirty="0" err="1">
+                <a:solidFill>
+                  <a:schemeClr val="bg1"/>
+                </a:solidFill>
+              </a:rPr>
+              <a:t>would</a:t>
+            </a:r>
+            <a:r>
+              <a:rPr lang="nb-NO" dirty="0">
+                <a:solidFill>
+                  <a:schemeClr val="bg1"/>
+                </a:solidFill>
+              </a:rPr>
+              <a:t> have done </a:t>
+            </a:r>
+            <a:r>
+              <a:rPr lang="nb-NO" dirty="0" err="1">
+                <a:solidFill>
+                  <a:schemeClr val="bg1"/>
+                </a:solidFill>
+              </a:rPr>
+              <a:t>diffrently</a:t>
+            </a:r>
+            <a:r>
+              <a:rPr lang="nb-NO" dirty="0">
+                <a:solidFill>
+                  <a:schemeClr val="bg1"/>
+                </a:solidFill>
+              </a:rPr>
+              <a:t>. </a:t>
+            </a:r>
+          </a:p>
+          <a:p>
+            <a:r>
+              <a:rPr lang="nb-NO" dirty="0" err="1">
+                <a:solidFill>
+                  <a:schemeClr val="bg1"/>
+                </a:solidFill>
+              </a:rPr>
+              <a:t>Lessons</a:t>
+            </a:r>
+            <a:r>
+              <a:rPr lang="nb-NO" dirty="0">
+                <a:solidFill>
+                  <a:schemeClr val="bg1"/>
+                </a:solidFill>
+              </a:rPr>
+              <a:t> </a:t>
+            </a:r>
+            <a:r>
+              <a:rPr lang="nb-NO" dirty="0" err="1">
+                <a:solidFill>
+                  <a:schemeClr val="bg1"/>
+                </a:solidFill>
+              </a:rPr>
+              <a:t>learned</a:t>
+            </a:r>
+            <a:r>
+              <a:rPr lang="nb-NO" dirty="0">
+                <a:solidFill>
+                  <a:schemeClr val="bg1"/>
+                </a:solidFill>
+              </a:rPr>
+              <a:t>.</a:t>
+            </a:r>
+          </a:p>
+        </p:txBody>
+      </p:sp>
+    </p:spTree>
+    <p:extLst>
+      <p:ext uri="{BB962C8B-B14F-4D97-AF65-F5344CB8AC3E}">
+        <p14:creationId xmlns:p14="http://schemas.microsoft.com/office/powerpoint/2010/main" val="916686767"/>
+      </p:ext>
+    </p:extLst>
+  </p:cSld>
+  <p:clrMapOvr>
+    <a:masterClrMapping/>
+  </p:clrMapOvr>
+</p:sld>
+</file>
+
+<file path=ppt/slides/slide7.xml><?xml version="1.0" encoding="utf-8"?>
+<p:sld xmlns:a="http://schemas.openxmlformats.org/drawingml/2006/main" xmlns:r="http://schemas.openxmlformats.org/officeDocument/2006/relationships" xmlns:p="http://schemas.openxmlformats.org/presentationml/2006/main">
+  <p:cSld>
+    <p:spTree>
+      <p:nvGrpSpPr>
+        <p:cNvPr id="1" name=""/>
+        <p:cNvGrpSpPr/>
+        <p:nvPr/>
+      </p:nvGrpSpPr>
+      <p:grpSpPr>
+        <a:xfrm>
+          <a:off x="0" y="0"/>
+          <a:ext cx="0" cy="0"/>
+          <a:chOff x="0" y="0"/>
+          <a:chExt cx="0" cy="0"/>
+        </a:xfrm>
+      </p:grpSpPr>
+      <p:pic>
+        <p:nvPicPr>
+          <p:cNvPr id="4" name="Picture 2">
+            <a:extLst>
+              <a:ext uri="{FF2B5EF4-FFF2-40B4-BE49-F238E27FC236}">
+                <a16:creationId xmlns:a16="http://schemas.microsoft.com/office/drawing/2014/main" id="{4A4F927E-3113-054C-B2A5-C48DFA5B266D}"/>
               </a:ext>
             </a:extLst>
           </p:cNvPr>
@@ -4149,7 +5315,7 @@
           </a:stretch>
         </p:blipFill>
         <p:spPr>
-          <a:xfrm>
+          <a:xfrm flipH="1">
             <a:off x="0" y="0"/>
             <a:ext cx="12192000" cy="6858000"/>
           </a:xfrm>
@@ -4163,7 +5329,7 @@
           <p:cNvPr id="6" name="Rectangle 5">
             <a:extLst>
               <a:ext uri="{FF2B5EF4-FFF2-40B4-BE49-F238E27FC236}">
-                <a16:creationId xmlns:a16="http://schemas.microsoft.com/office/drawing/2014/main" id="{F5E4AF25-A7E8-FF46-9275-F7C186045F1F}"/>
+                <a16:creationId xmlns:a16="http://schemas.microsoft.com/office/drawing/2014/main" id="{32720EE7-F122-684E-A639-9CA8D722242D}"/>
               </a:ext>
             </a:extLst>
           </p:cNvPr>
@@ -4217,7 +5383,7 @@
           <p:cNvPr id="2" name="Title 1">
             <a:extLst>
               <a:ext uri="{FF2B5EF4-FFF2-40B4-BE49-F238E27FC236}">
-                <a16:creationId xmlns:a16="http://schemas.microsoft.com/office/drawing/2014/main" id="{FE3EFCAC-F830-BE41-BEAC-BBD0CC1C4474}"/>
+                <a16:creationId xmlns:a16="http://schemas.microsoft.com/office/drawing/2014/main" id="{E3A0B983-E171-054F-AB80-7A29721A09E4}"/>
               </a:ext>
             </a:extLst>
           </p:cNvPr>
@@ -4234,178 +5400,94 @@
           <a:lstStyle/>
           <a:p>
             <a:r>
+              <a:rPr lang="nb-NO" dirty="0">
+                <a:solidFill>
+                  <a:schemeClr val="bg1"/>
+                </a:solidFill>
+              </a:rPr>
+              <a:t>Styletile:</a:t>
+            </a:r>
+          </a:p>
+        </p:txBody>
+      </p:sp>
+      <p:sp>
+        <p:nvSpPr>
+          <p:cNvPr id="3" name="Content Placeholder 2">
+            <a:extLst>
+              <a:ext uri="{FF2B5EF4-FFF2-40B4-BE49-F238E27FC236}">
+                <a16:creationId xmlns:a16="http://schemas.microsoft.com/office/drawing/2014/main" id="{4C5A656F-E6FB-F546-928A-3E27CCE9EA2C}"/>
+              </a:ext>
+            </a:extLst>
+          </p:cNvPr>
+          <p:cNvSpPr>
+            <a:spLocks noGrp="1"/>
+          </p:cNvSpPr>
+          <p:nvPr>
+            <p:ph idx="1"/>
+          </p:nvPr>
+        </p:nvSpPr>
+        <p:spPr/>
+        <p:txBody>
+          <a:bodyPr/>
+          <a:lstStyle/>
+          <a:p>
+            <a:r>
+              <a:rPr lang="nb-NO" dirty="0">
+                <a:solidFill>
+                  <a:schemeClr val="bg1"/>
+                </a:solidFill>
+              </a:rPr>
+              <a:t>Fonts used</a:t>
+            </a:r>
+          </a:p>
+          <a:p>
+            <a:r>
+              <a:rPr lang="nb-NO" dirty="0">
+                <a:solidFill>
+                  <a:schemeClr val="bg1"/>
+                </a:solidFill>
+              </a:rPr>
+              <a:t>Buttons</a:t>
+            </a:r>
+          </a:p>
+          <a:p>
+            <a:r>
+              <a:rPr lang="nb-NO" dirty="0">
+                <a:solidFill>
+                  <a:schemeClr val="bg1"/>
+                </a:solidFill>
+              </a:rPr>
+              <a:t>Logos</a:t>
+            </a:r>
+          </a:p>
+          <a:p>
+            <a:r>
+              <a:rPr lang="nb-NO" dirty="0">
+                <a:solidFill>
+                  <a:schemeClr val="bg1"/>
+                </a:solidFill>
+              </a:rPr>
+              <a:t>Graphics</a:t>
+            </a:r>
+          </a:p>
+          <a:p>
+            <a:r>
+              <a:rPr lang="nb-NO" dirty="0">
+                <a:solidFill>
+                  <a:schemeClr val="bg1"/>
+                </a:solidFill>
+              </a:rPr>
+              <a:t>Pictures</a:t>
+            </a:r>
+          </a:p>
+          <a:p>
+            <a:r>
               <a:rPr lang="nb-NO" dirty="0" err="1">
                 <a:solidFill>
                   <a:schemeClr val="bg1"/>
                 </a:solidFill>
               </a:rPr>
-              <a:t>Themes</a:t>
-            </a:r>
-            <a:r>
-              <a:rPr lang="nb-NO" dirty="0">
-                <a:solidFill>
-                  <a:schemeClr val="bg1"/>
-                </a:solidFill>
-              </a:rPr>
-              <a:t>, </a:t>
-            </a:r>
-            <a:r>
-              <a:rPr lang="nb-NO" dirty="0" err="1">
-                <a:solidFill>
-                  <a:schemeClr val="bg1"/>
-                </a:solidFill>
-              </a:rPr>
-              <a:t>epics</a:t>
-            </a:r>
-            <a:r>
-              <a:rPr lang="nb-NO" dirty="0">
-                <a:solidFill>
-                  <a:schemeClr val="bg1"/>
-                </a:solidFill>
-              </a:rPr>
-              <a:t>, </a:t>
-            </a:r>
-            <a:r>
-              <a:rPr lang="nb-NO" dirty="0" err="1">
-                <a:solidFill>
-                  <a:schemeClr val="bg1"/>
-                </a:solidFill>
-              </a:rPr>
-              <a:t>features</a:t>
-            </a:r>
-            <a:r>
-              <a:rPr lang="nb-NO" dirty="0">
-                <a:solidFill>
-                  <a:schemeClr val="bg1"/>
-                </a:solidFill>
-              </a:rPr>
-              <a:t>, </a:t>
-            </a:r>
-            <a:r>
-              <a:rPr lang="nb-NO" dirty="0" err="1">
-                <a:solidFill>
-                  <a:schemeClr val="bg1"/>
-                </a:solidFill>
-              </a:rPr>
-              <a:t>user</a:t>
-            </a:r>
-            <a:r>
-              <a:rPr lang="nb-NO" dirty="0">
-                <a:solidFill>
-                  <a:schemeClr val="bg1"/>
-                </a:solidFill>
-              </a:rPr>
-              <a:t> </a:t>
-            </a:r>
-            <a:r>
-              <a:rPr lang="nb-NO" dirty="0" err="1">
-                <a:solidFill>
-                  <a:schemeClr val="bg1"/>
-                </a:solidFill>
-              </a:rPr>
-              <a:t>stories</a:t>
-            </a:r>
-            <a:br>
-              <a:rPr lang="nb-NO" dirty="0">
-                <a:solidFill>
-                  <a:schemeClr val="bg1"/>
-                </a:solidFill>
-              </a:rPr>
-            </a:br>
-            <a:endParaRPr lang="nb-NO" dirty="0"/>
-          </a:p>
-        </p:txBody>
-      </p:sp>
-      <p:sp>
-        <p:nvSpPr>
-          <p:cNvPr id="3" name="Content Placeholder 2">
-            <a:extLst>
-              <a:ext uri="{FF2B5EF4-FFF2-40B4-BE49-F238E27FC236}">
-                <a16:creationId xmlns:a16="http://schemas.microsoft.com/office/drawing/2014/main" id="{964288EC-5A05-AE43-8273-581F82B296B7}"/>
-              </a:ext>
-            </a:extLst>
-          </p:cNvPr>
-          <p:cNvSpPr>
-            <a:spLocks noGrp="1"/>
-          </p:cNvSpPr>
-          <p:nvPr>
-            <p:ph idx="1"/>
-          </p:nvPr>
-        </p:nvSpPr>
-        <p:spPr>
-          <a:xfrm>
-            <a:off x="2584806" y="1558497"/>
-            <a:ext cx="4720119" cy="4351338"/>
-          </a:xfrm>
-        </p:spPr>
-        <p:txBody>
-          <a:bodyPr/>
-          <a:lstStyle/>
-          <a:p>
-            <a:pPr marL="0" indent="0">
-              <a:buNone/>
-            </a:pPr>
-            <a:r>
-              <a:rPr lang="nb-NO" dirty="0" err="1">
-                <a:solidFill>
-                  <a:schemeClr val="bg1"/>
-                </a:solidFill>
-              </a:rPr>
-              <a:t>Why</a:t>
-            </a:r>
-            <a:r>
-              <a:rPr lang="nb-NO" dirty="0">
-                <a:solidFill>
-                  <a:schemeClr val="bg1"/>
-                </a:solidFill>
-              </a:rPr>
-              <a:t> I </a:t>
-            </a:r>
-            <a:r>
-              <a:rPr lang="nb-NO" dirty="0" err="1">
-                <a:solidFill>
-                  <a:schemeClr val="bg1"/>
-                </a:solidFill>
-              </a:rPr>
-              <a:t>chose</a:t>
-            </a:r>
-            <a:r>
-              <a:rPr lang="nb-NO" dirty="0">
-                <a:solidFill>
-                  <a:schemeClr val="bg1"/>
-                </a:solidFill>
-              </a:rPr>
-              <a:t> </a:t>
-            </a:r>
-            <a:r>
-              <a:rPr lang="nb-NO" dirty="0" err="1">
-                <a:solidFill>
-                  <a:schemeClr val="bg1"/>
-                </a:solidFill>
-              </a:rPr>
-              <a:t>the</a:t>
-            </a:r>
-            <a:r>
-              <a:rPr lang="nb-NO" dirty="0">
-                <a:solidFill>
-                  <a:schemeClr val="bg1"/>
-                </a:solidFill>
-              </a:rPr>
-              <a:t> different </a:t>
-            </a:r>
-          </a:p>
-          <a:p>
-            <a:pPr>
-              <a:buFont typeface="Wingdings" pitchFamily="2" charset="2"/>
-              <a:buChar char="v"/>
-            </a:pPr>
-            <a:r>
-              <a:rPr lang="nb-NO" dirty="0" err="1">
-                <a:solidFill>
-                  <a:schemeClr val="bg1"/>
-                </a:solidFill>
-              </a:rPr>
-              <a:t>Themes</a:t>
+              <a:t>Colour-schemes</a:t>
             </a:r>
             <a:endParaRPr lang="nb-NO" dirty="0">
               <a:solidFill>
@@ -4414,76 +5496,17 @@
             </a:endParaRPr>
           </a:p>
           <a:p>
-            <a:pPr>
-              <a:buFont typeface="Wingdings" pitchFamily="2" charset="2"/>
-              <a:buChar char="v"/>
-            </a:pPr>
-            <a:r>
-              <a:rPr lang="nb-NO" dirty="0" err="1">
-                <a:solidFill>
-                  <a:schemeClr val="bg1"/>
-                </a:solidFill>
-              </a:rPr>
-              <a:t>Epics</a:t>
-            </a:r>
-            <a:endParaRPr lang="nb-NO" dirty="0">
-              <a:solidFill>
-                <a:schemeClr val="bg1"/>
-              </a:solidFill>
-            </a:endParaRPr>
-          </a:p>
-          <a:p>
-            <a:pPr>
-              <a:buFont typeface="Wingdings" pitchFamily="2" charset="2"/>
-              <a:buChar char="v"/>
-            </a:pPr>
-            <a:r>
-              <a:rPr lang="nb-NO" dirty="0" err="1">
-                <a:solidFill>
-                  <a:schemeClr val="bg1"/>
-                </a:solidFill>
-              </a:rPr>
-              <a:t>Features</a:t>
-            </a:r>
-            <a:endParaRPr lang="nb-NO" dirty="0">
-              <a:solidFill>
-                <a:schemeClr val="bg1"/>
-              </a:solidFill>
-            </a:endParaRPr>
-          </a:p>
-          <a:p>
-            <a:pPr>
-              <a:buFont typeface="Wingdings" pitchFamily="2" charset="2"/>
-              <a:buChar char="v"/>
-            </a:pPr>
-            <a:r>
-              <a:rPr lang="nb-NO" dirty="0">
-                <a:solidFill>
-                  <a:schemeClr val="bg1"/>
-                </a:solidFill>
-              </a:rPr>
-              <a:t>User </a:t>
-            </a:r>
-            <a:r>
-              <a:rPr lang="nb-NO" dirty="0" err="1">
-                <a:solidFill>
-                  <a:schemeClr val="bg1"/>
-                </a:solidFill>
-              </a:rPr>
-              <a:t>stories</a:t>
-            </a:r>
-            <a:endParaRPr lang="nb-NO" dirty="0">
-              <a:solidFill>
-                <a:schemeClr val="bg1"/>
-              </a:solidFill>
-            </a:endParaRPr>
+            <a:endParaRPr lang="nb-NO" dirty="0"/>
+          </a:p>
+          <a:p>
+            <a:endParaRPr lang="nb-NO" dirty="0"/>
           </a:p>
         </p:txBody>
       </p:sp>
     </p:spTree>
     <p:extLst>
       <p:ext uri="{BB962C8B-B14F-4D97-AF65-F5344CB8AC3E}">
-        <p14:creationId xmlns:p14="http://schemas.microsoft.com/office/powerpoint/2010/main" val="2464846779"/>
+        <p14:creationId xmlns:p14="http://schemas.microsoft.com/office/powerpoint/2010/main" val="4009127440"/>
       </p:ext>
     </p:extLst>
   </p:cSld>
@@ -4493,411 +5516,7 @@
 </p:sld>
 </file>
 
-<file path=ppt/slides/slide4.xml><?xml version="1.0" encoding="utf-8"?>
-<p:sld xmlns:a="http://schemas.openxmlformats.org/drawingml/2006/main" xmlns:r="http://schemas.openxmlformats.org/officeDocument/2006/relationships" xmlns:p="http://schemas.openxmlformats.org/presentationml/2006/main">
-  <p:cSld>
-    <p:spTree>
-      <p:nvGrpSpPr>
-        <p:cNvPr id="1" name=""/>
-        <p:cNvGrpSpPr/>
-        <p:nvPr/>
-      </p:nvGrpSpPr>
-      <p:grpSpPr>
-        <a:xfrm>
-          <a:off x="0" y="0"/>
-          <a:ext cx="0" cy="0"/>
-          <a:chOff x="0" y="0"/>
-          <a:chExt cx="0" cy="0"/>
-        </a:xfrm>
-      </p:grpSpPr>
-      <p:pic>
-        <p:nvPicPr>
-          <p:cNvPr id="4" name="Picture 3">
-            <a:extLst>
-              <a:ext uri="{FF2B5EF4-FFF2-40B4-BE49-F238E27FC236}">
-                <a16:creationId xmlns:a16="http://schemas.microsoft.com/office/drawing/2014/main" id="{3B11CB68-BFCC-634D-A667-18DEBE043427}"/>
-              </a:ext>
-            </a:extLst>
-          </p:cNvPr>
-          <p:cNvPicPr>
-            <a:picLocks noChangeAspect="1"/>
-          </p:cNvPicPr>
-          <p:nvPr/>
-        </p:nvPicPr>
-        <p:blipFill rotWithShape="1">
-          <a:blip r:embed="rId2"/>
-          <a:srcRect t="6666"/>
-          <a:stretch/>
-        </p:blipFill>
-        <p:spPr>
-          <a:xfrm>
-            <a:off x="0" y="0"/>
-            <a:ext cx="12220546" cy="7140539"/>
-          </a:xfrm>
-          <a:prstGeom prst="rect">
-            <a:avLst/>
-          </a:prstGeom>
-        </p:spPr>
-      </p:pic>
-      <p:sp>
-        <p:nvSpPr>
-          <p:cNvPr id="5" name="Rectangle 4">
-            <a:extLst>
-              <a:ext uri="{FF2B5EF4-FFF2-40B4-BE49-F238E27FC236}">
-                <a16:creationId xmlns:a16="http://schemas.microsoft.com/office/drawing/2014/main" id="{C035E99D-8C70-A746-9315-4514378BBF25}"/>
-              </a:ext>
-            </a:extLst>
-          </p:cNvPr>
-          <p:cNvSpPr/>
-          <p:nvPr/>
-        </p:nvSpPr>
-        <p:spPr>
-          <a:xfrm>
-            <a:off x="0" y="0"/>
-            <a:ext cx="12209460" cy="7068620"/>
-          </a:xfrm>
-          <a:prstGeom prst="rect">
-            <a:avLst/>
-          </a:prstGeom>
-          <a:solidFill>
-            <a:schemeClr val="tx1">
-              <a:alpha val="43000"/>
-            </a:schemeClr>
-          </a:solidFill>
-          <a:ln>
-            <a:noFill/>
-          </a:ln>
-        </p:spPr>
-        <p:style>
-          <a:lnRef idx="2">
-            <a:schemeClr val="accent1">
-              <a:shade val="50000"/>
-            </a:schemeClr>
-          </a:lnRef>
-          <a:fillRef idx="1">
-            <a:schemeClr val="accent1"/>
-          </a:fillRef>
-          <a:effectRef idx="0">
-            <a:schemeClr val="accent1"/>
-          </a:effectRef>
-          <a:fontRef idx="minor">
-            <a:schemeClr val="lt1"/>
-          </a:fontRef>
-        </p:style>
-        <p:txBody>
-          <a:bodyPr rtlCol="0" anchor="ctr"/>
-          <a:lstStyle/>
-          <a:p>
-            <a:pPr algn="ctr"/>
-            <a:endParaRPr lang="en-US"/>
-          </a:p>
-        </p:txBody>
-      </p:sp>
-      <p:sp>
-        <p:nvSpPr>
-          <p:cNvPr id="2" name="Title 1">
-            <a:extLst>
-              <a:ext uri="{FF2B5EF4-FFF2-40B4-BE49-F238E27FC236}">
-                <a16:creationId xmlns:a16="http://schemas.microsoft.com/office/drawing/2014/main" id="{BCCEAD39-1FE4-5C44-9E5C-A8114FD20B4E}"/>
-              </a:ext>
-            </a:extLst>
-          </p:cNvPr>
-          <p:cNvSpPr>
-            <a:spLocks noGrp="1"/>
-          </p:cNvSpPr>
-          <p:nvPr>
-            <p:ph type="title"/>
-          </p:nvPr>
-        </p:nvSpPr>
-        <p:spPr/>
-        <p:txBody>
-          <a:bodyPr/>
-          <a:lstStyle/>
-          <a:p>
-            <a:r>
-              <a:rPr lang="nb-NO" dirty="0">
-                <a:solidFill>
-                  <a:schemeClr val="bg1"/>
-                </a:solidFill>
-              </a:rPr>
-              <a:t>Scope </a:t>
-            </a:r>
-            <a:r>
-              <a:rPr lang="nb-NO" dirty="0" err="1">
-                <a:solidFill>
-                  <a:schemeClr val="bg1"/>
-                </a:solidFill>
-              </a:rPr>
-              <a:t>of</a:t>
-            </a:r>
-            <a:r>
-              <a:rPr lang="nb-NO" dirty="0">
-                <a:solidFill>
-                  <a:schemeClr val="bg1"/>
-                </a:solidFill>
-              </a:rPr>
-              <a:t> </a:t>
-            </a:r>
-            <a:r>
-              <a:rPr lang="nb-NO" dirty="0" err="1">
-                <a:solidFill>
-                  <a:schemeClr val="bg1"/>
-                </a:solidFill>
-              </a:rPr>
-              <a:t>Work</a:t>
-            </a:r>
-            <a:r>
-              <a:rPr lang="nb-NO" dirty="0">
-                <a:solidFill>
-                  <a:schemeClr val="bg1"/>
-                </a:solidFill>
-              </a:rPr>
-              <a:t> and </a:t>
-            </a:r>
-            <a:r>
-              <a:rPr lang="nb-NO" dirty="0" err="1">
-                <a:solidFill>
-                  <a:schemeClr val="bg1"/>
-                </a:solidFill>
-              </a:rPr>
-              <a:t>Gantt</a:t>
-            </a:r>
-            <a:r>
-              <a:rPr lang="nb-NO" dirty="0">
-                <a:solidFill>
-                  <a:schemeClr val="bg1"/>
-                </a:solidFill>
-              </a:rPr>
-              <a:t> </a:t>
-            </a:r>
-            <a:r>
-              <a:rPr lang="nb-NO" dirty="0" err="1">
-                <a:solidFill>
-                  <a:schemeClr val="bg1"/>
-                </a:solidFill>
-              </a:rPr>
-              <a:t>chart</a:t>
-            </a:r>
-            <a:br>
-              <a:rPr lang="nb-NO" dirty="0">
-                <a:solidFill>
-                  <a:schemeClr val="bg1"/>
-                </a:solidFill>
-              </a:rPr>
-            </a:br>
-            <a:endParaRPr lang="nb-NO" dirty="0"/>
-          </a:p>
-        </p:txBody>
-      </p:sp>
-      <p:sp>
-        <p:nvSpPr>
-          <p:cNvPr id="3" name="Content Placeholder 2">
-            <a:extLst>
-              <a:ext uri="{FF2B5EF4-FFF2-40B4-BE49-F238E27FC236}">
-                <a16:creationId xmlns:a16="http://schemas.microsoft.com/office/drawing/2014/main" id="{EF480F7C-ACFA-A24A-9DB4-2C4D40A03809}"/>
-              </a:ext>
-            </a:extLst>
-          </p:cNvPr>
-          <p:cNvSpPr>
-            <a:spLocks noGrp="1"/>
-          </p:cNvSpPr>
-          <p:nvPr>
-            <p:ph idx="1"/>
-          </p:nvPr>
-        </p:nvSpPr>
-        <p:spPr>
-          <a:xfrm>
-            <a:off x="2256034" y="1507126"/>
-            <a:ext cx="6209872" cy="4351338"/>
-          </a:xfrm>
-        </p:spPr>
-        <p:txBody>
-          <a:bodyPr/>
-          <a:lstStyle/>
-          <a:p>
-            <a:r>
-              <a:rPr lang="nb-NO" dirty="0">
-                <a:solidFill>
-                  <a:schemeClr val="bg1"/>
-                </a:solidFill>
-              </a:rPr>
-              <a:t>Present Scope </a:t>
-            </a:r>
-            <a:r>
-              <a:rPr lang="nb-NO" dirty="0" err="1">
-                <a:solidFill>
-                  <a:schemeClr val="bg1"/>
-                </a:solidFill>
-              </a:rPr>
-              <a:t>of</a:t>
-            </a:r>
-            <a:r>
-              <a:rPr lang="nb-NO" dirty="0">
-                <a:solidFill>
-                  <a:schemeClr val="bg1"/>
-                </a:solidFill>
-              </a:rPr>
-              <a:t> </a:t>
-            </a:r>
-            <a:r>
-              <a:rPr lang="nb-NO" dirty="0" err="1">
-                <a:solidFill>
-                  <a:schemeClr val="bg1"/>
-                </a:solidFill>
-              </a:rPr>
-              <a:t>work</a:t>
-            </a:r>
-            <a:r>
-              <a:rPr lang="nb-NO" dirty="0">
-                <a:solidFill>
-                  <a:schemeClr val="bg1"/>
-                </a:solidFill>
-              </a:rPr>
-              <a:t> rev 1A</a:t>
-            </a:r>
-          </a:p>
-          <a:p>
-            <a:r>
-              <a:rPr lang="nb-NO" dirty="0">
-                <a:solidFill>
-                  <a:schemeClr val="bg1"/>
-                </a:solidFill>
-              </a:rPr>
-              <a:t>Present </a:t>
-            </a:r>
-            <a:r>
-              <a:rPr lang="nb-NO" dirty="0" err="1">
-                <a:solidFill>
-                  <a:schemeClr val="bg1"/>
-                </a:solidFill>
-              </a:rPr>
-              <a:t>Gantt</a:t>
-            </a:r>
-            <a:r>
-              <a:rPr lang="nb-NO" dirty="0">
-                <a:solidFill>
-                  <a:schemeClr val="bg1"/>
-                </a:solidFill>
-              </a:rPr>
-              <a:t> </a:t>
-            </a:r>
-            <a:r>
-              <a:rPr lang="nb-NO" dirty="0" err="1">
-                <a:solidFill>
-                  <a:schemeClr val="bg1"/>
-                </a:solidFill>
-              </a:rPr>
-              <a:t>chart</a:t>
-            </a:r>
-            <a:r>
-              <a:rPr lang="nb-NO" dirty="0">
-                <a:solidFill>
-                  <a:schemeClr val="bg1"/>
-                </a:solidFill>
-              </a:rPr>
-              <a:t> rev 1A</a:t>
-            </a:r>
-          </a:p>
-          <a:p>
-            <a:r>
-              <a:rPr lang="nb-NO" dirty="0" err="1">
-                <a:solidFill>
-                  <a:schemeClr val="bg1"/>
-                </a:solidFill>
-              </a:rPr>
-              <a:t>What</a:t>
-            </a:r>
-            <a:r>
-              <a:rPr lang="nb-NO" dirty="0">
-                <a:solidFill>
-                  <a:schemeClr val="bg1"/>
-                </a:solidFill>
-              </a:rPr>
-              <a:t> I </a:t>
-            </a:r>
-            <a:r>
-              <a:rPr lang="nb-NO" dirty="0" err="1">
-                <a:solidFill>
-                  <a:schemeClr val="bg1"/>
-                </a:solidFill>
-              </a:rPr>
-              <a:t>would</a:t>
-            </a:r>
-            <a:r>
-              <a:rPr lang="nb-NO" dirty="0">
-                <a:solidFill>
-                  <a:schemeClr val="bg1"/>
-                </a:solidFill>
-              </a:rPr>
-              <a:t> have done </a:t>
-            </a:r>
-            <a:r>
-              <a:rPr lang="nb-NO" dirty="0" err="1">
-                <a:solidFill>
-                  <a:schemeClr val="bg1"/>
-                </a:solidFill>
-              </a:rPr>
-              <a:t>diffrently</a:t>
-            </a:r>
-            <a:r>
-              <a:rPr lang="nb-NO" dirty="0">
-                <a:solidFill>
-                  <a:schemeClr val="bg1"/>
-                </a:solidFill>
-              </a:rPr>
-              <a:t>. </a:t>
-            </a:r>
-          </a:p>
-          <a:p>
-            <a:r>
-              <a:rPr lang="nb-NO" dirty="0" err="1">
-                <a:solidFill>
-                  <a:schemeClr val="bg1"/>
-                </a:solidFill>
-              </a:rPr>
-              <a:t>Lessons</a:t>
-            </a:r>
-            <a:r>
-              <a:rPr lang="nb-NO" dirty="0">
-                <a:solidFill>
-                  <a:schemeClr val="bg1"/>
-                </a:solidFill>
-              </a:rPr>
-              <a:t> </a:t>
-            </a:r>
-            <a:r>
-              <a:rPr lang="nb-NO" dirty="0" err="1">
-                <a:solidFill>
-                  <a:schemeClr val="bg1"/>
-                </a:solidFill>
-              </a:rPr>
-              <a:t>learned</a:t>
-            </a:r>
-            <a:r>
-              <a:rPr lang="nb-NO" dirty="0">
-                <a:solidFill>
-                  <a:schemeClr val="bg1"/>
-                </a:solidFill>
-              </a:rPr>
-              <a:t>.</a:t>
-            </a:r>
-          </a:p>
-        </p:txBody>
-      </p:sp>
-    </p:spTree>
-    <p:extLst>
-      <p:ext uri="{BB962C8B-B14F-4D97-AF65-F5344CB8AC3E}">
-        <p14:creationId xmlns:p14="http://schemas.microsoft.com/office/powerpoint/2010/main" val="916686767"/>
-      </p:ext>
-    </p:extLst>
-  </p:cSld>
-  <p:clrMapOvr>
-    <a:masterClrMapping/>
-  </p:clrMapOvr>
-</p:sld>
-</file>
-
-<file path=ppt/slides/slide5.xml><?xml version="1.0" encoding="utf-8"?>
+<file path=ppt/slides/slide8.xml><?xml version="1.0" encoding="utf-8"?>
 <p:sld xmlns:a="http://schemas.openxmlformats.org/drawingml/2006/main" xmlns:r="http://schemas.openxmlformats.org/officeDocument/2006/relationships" xmlns:p="http://schemas.openxmlformats.org/presentationml/2006/main">
   <p:cSld>
     <p:spTree>
@@ -5211,7 +5830,7 @@
 </p:sld>
 </file>
 
-<file path=ppt/slides/slide6.xml><?xml version="1.0" encoding="utf-8"?>
+<file path=ppt/slides/slide9.xml><?xml version="1.0" encoding="utf-8"?>
 <p:sld xmlns:a="http://schemas.openxmlformats.org/drawingml/2006/main" xmlns:r="http://schemas.openxmlformats.org/officeDocument/2006/relationships" xmlns:p="http://schemas.openxmlformats.org/presentationml/2006/main">
   <p:cSld>
     <p:spTree>
@@ -5389,11 +6008,21 @@
               </a:rPr>
               <a:t>product</a:t>
             </a:r>
-            <a:endParaRPr lang="nb-NO" dirty="0">
-              <a:solidFill>
-                <a:schemeClr val="bg1"/>
-              </a:solidFill>
-            </a:endParaRPr>
+            <a:r>
+              <a:rPr lang="nb-NO" dirty="0">
+                <a:solidFill>
+                  <a:schemeClr val="bg1"/>
+                </a:solidFill>
+              </a:rPr>
+              <a:t>:  </a:t>
+            </a:r>
+            <a:r>
+              <a:rPr lang="nb-NO" dirty="0">
+                <a:hlinkClick r:id="rId3"/>
+              </a:rPr>
+              <a:t>http://eduplaytion.filipnordhagen.com/index.html</a:t>
+            </a:r>
+            <a:endParaRPr lang="nb-NO" dirty="0"/>
           </a:p>
           <a:p>
             <a:r>
@@ -5569,372 +6198,6 @@
     <p:extLst>
       <p:ext uri="{BB962C8B-B14F-4D97-AF65-F5344CB8AC3E}">
         <p14:creationId xmlns:p14="http://schemas.microsoft.com/office/powerpoint/2010/main" val="2862594203"/>
-      </p:ext>
-    </p:extLst>
-  </p:cSld>
-  <p:clrMapOvr>
-    <a:masterClrMapping/>
-  </p:clrMapOvr>
-</p:sld>
-</file>
-
-<file path=ppt/slides/slide7.xml><?xml version="1.0" encoding="utf-8"?>
-<p:sld xmlns:a="http://schemas.openxmlformats.org/drawingml/2006/main" xmlns:r="http://schemas.openxmlformats.org/officeDocument/2006/relationships" xmlns:p="http://schemas.openxmlformats.org/presentationml/2006/main">
-  <p:cSld>
-    <p:spTree>
-      <p:nvGrpSpPr>
-        <p:cNvPr id="1" name=""/>
-        <p:cNvGrpSpPr/>
-        <p:nvPr/>
-      </p:nvGrpSpPr>
-      <p:grpSpPr>
-        <a:xfrm>
-          <a:off x="0" y="0"/>
-          <a:ext cx="0" cy="0"/>
-          <a:chOff x="0" y="0"/>
-          <a:chExt cx="0" cy="0"/>
-        </a:xfrm>
-      </p:grpSpPr>
-      <p:pic>
-        <p:nvPicPr>
-          <p:cNvPr id="5" name="Picture 4">
-            <a:extLst>
-              <a:ext uri="{FF2B5EF4-FFF2-40B4-BE49-F238E27FC236}">
-                <a16:creationId xmlns:a16="http://schemas.microsoft.com/office/drawing/2014/main" id="{39B5D36C-1CBF-1049-8A9D-782947C86446}"/>
-              </a:ext>
-            </a:extLst>
-          </p:cNvPr>
-          <p:cNvPicPr>
-            <a:picLocks noChangeAspect="1"/>
-          </p:cNvPicPr>
-          <p:nvPr/>
-        </p:nvPicPr>
-        <p:blipFill>
-          <a:blip r:embed="rId2"/>
-          <a:stretch>
-            <a:fillRect/>
-          </a:stretch>
-        </p:blipFill>
-        <p:spPr>
-          <a:xfrm>
-            <a:off x="0" y="0"/>
-            <a:ext cx="12192000" cy="6858000"/>
-          </a:xfrm>
-          <a:prstGeom prst="rect">
-            <a:avLst/>
-          </a:prstGeom>
-        </p:spPr>
-      </p:pic>
-      <p:sp>
-        <p:nvSpPr>
-          <p:cNvPr id="6" name="Rectangle 5">
-            <a:extLst>
-              <a:ext uri="{FF2B5EF4-FFF2-40B4-BE49-F238E27FC236}">
-                <a16:creationId xmlns:a16="http://schemas.microsoft.com/office/drawing/2014/main" id="{03B44277-5890-7348-BBE9-B18D4F242988}"/>
-              </a:ext>
-            </a:extLst>
-          </p:cNvPr>
-          <p:cNvSpPr/>
-          <p:nvPr/>
-        </p:nvSpPr>
-        <p:spPr>
-          <a:xfrm>
-            <a:off x="-1" y="0"/>
-            <a:ext cx="12191999" cy="6858000"/>
-          </a:xfrm>
-          <a:prstGeom prst="rect">
-            <a:avLst/>
-          </a:prstGeom>
-          <a:solidFill>
-            <a:schemeClr val="tx1">
-              <a:alpha val="43000"/>
-            </a:schemeClr>
-          </a:solidFill>
-          <a:ln>
-            <a:noFill/>
-          </a:ln>
-        </p:spPr>
-        <p:style>
-          <a:lnRef idx="2">
-            <a:schemeClr val="accent1">
-              <a:shade val="50000"/>
-            </a:schemeClr>
-          </a:lnRef>
-          <a:fillRef idx="1">
-            <a:schemeClr val="accent1"/>
-          </a:fillRef>
-          <a:effectRef idx="0">
-            <a:schemeClr val="accent1"/>
-          </a:effectRef>
-          <a:fontRef idx="minor">
-            <a:schemeClr val="lt1"/>
-          </a:fontRef>
-        </p:style>
-        <p:txBody>
-          <a:bodyPr rtlCol="0" anchor="ctr"/>
-          <a:lstStyle/>
-          <a:p>
-            <a:pPr algn="ctr"/>
-            <a:endParaRPr lang="en-US" dirty="0"/>
-          </a:p>
-        </p:txBody>
-      </p:sp>
-      <p:sp>
-        <p:nvSpPr>
-          <p:cNvPr id="2" name="Title 1">
-            <a:extLst>
-              <a:ext uri="{FF2B5EF4-FFF2-40B4-BE49-F238E27FC236}">
-                <a16:creationId xmlns:a16="http://schemas.microsoft.com/office/drawing/2014/main" id="{33AEF9F6-4647-2942-BA24-CCEAF054805D}"/>
-              </a:ext>
-            </a:extLst>
-          </p:cNvPr>
-          <p:cNvSpPr>
-            <a:spLocks noGrp="1"/>
-          </p:cNvSpPr>
-          <p:nvPr>
-            <p:ph type="title"/>
-          </p:nvPr>
-        </p:nvSpPr>
-        <p:spPr/>
-        <p:txBody>
-          <a:bodyPr/>
-          <a:lstStyle/>
-          <a:p>
-            <a:pPr algn="just"/>
-            <a:r>
-              <a:rPr lang="nb-NO" dirty="0">
-                <a:solidFill>
-                  <a:schemeClr val="bg1"/>
-                </a:solidFill>
-              </a:rPr>
-              <a:t>Q&amp;A</a:t>
-            </a:r>
-            <a:br>
-              <a:rPr lang="nb-NO" dirty="0">
-                <a:solidFill>
-                  <a:schemeClr val="bg1"/>
-                </a:solidFill>
-              </a:rPr>
-            </a:br>
-            <a:endParaRPr lang="nb-NO" dirty="0"/>
-          </a:p>
-        </p:txBody>
-      </p:sp>
-      <p:sp>
-        <p:nvSpPr>
-          <p:cNvPr id="3" name="Content Placeholder 2">
-            <a:extLst>
-              <a:ext uri="{FF2B5EF4-FFF2-40B4-BE49-F238E27FC236}">
-                <a16:creationId xmlns:a16="http://schemas.microsoft.com/office/drawing/2014/main" id="{C604B62E-7971-044E-85A4-11DD4A07F0D9}"/>
-              </a:ext>
-            </a:extLst>
-          </p:cNvPr>
-          <p:cNvSpPr>
-            <a:spLocks noGrp="1"/>
-          </p:cNvSpPr>
-          <p:nvPr>
-            <p:ph idx="1"/>
-          </p:nvPr>
-        </p:nvSpPr>
-        <p:spPr>
-          <a:xfrm>
-            <a:off x="838200" y="1130157"/>
-            <a:ext cx="10515600" cy="5568594"/>
-          </a:xfrm>
-        </p:spPr>
-        <p:txBody>
-          <a:bodyPr>
-            <a:normAutofit/>
-          </a:bodyPr>
-          <a:lstStyle/>
-          <a:p>
-            <a:pPr marL="0" indent="0">
-              <a:buNone/>
-            </a:pPr>
-            <a:endParaRPr lang="nb-NO" dirty="0">
-              <a:solidFill>
-                <a:schemeClr val="bg1"/>
-              </a:solidFill>
-            </a:endParaRPr>
-          </a:p>
-          <a:p>
-            <a:pPr marL="0" indent="0">
-              <a:buNone/>
-            </a:pPr>
-            <a:endParaRPr lang="nb-NO" dirty="0">
-              <a:solidFill>
-                <a:schemeClr val="bg1"/>
-              </a:solidFill>
-            </a:endParaRPr>
-          </a:p>
-          <a:p>
-            <a:pPr marL="0" indent="0" algn="ctr">
-              <a:buNone/>
-            </a:pPr>
-            <a:r>
-              <a:rPr lang="nb-NO" sz="3900" dirty="0" err="1">
-                <a:solidFill>
-                  <a:schemeClr val="bg1"/>
-                </a:solidFill>
-              </a:rPr>
-              <a:t>Any</a:t>
-            </a:r>
-            <a:r>
-              <a:rPr lang="nb-NO" sz="3900" dirty="0">
-                <a:solidFill>
-                  <a:schemeClr val="bg1"/>
-                </a:solidFill>
-              </a:rPr>
-              <a:t> Questions???</a:t>
-            </a:r>
-          </a:p>
-          <a:p>
-            <a:pPr marL="0" indent="0" algn="ctr">
-              <a:buNone/>
-            </a:pPr>
-            <a:endParaRPr lang="nb-NO" sz="3900" dirty="0">
-              <a:solidFill>
-                <a:schemeClr val="bg1"/>
-              </a:solidFill>
-            </a:endParaRPr>
-          </a:p>
-          <a:p>
-            <a:pPr marL="0" indent="0" algn="ctr">
-              <a:buNone/>
-            </a:pPr>
-            <a:r>
-              <a:rPr lang="nb-NO" sz="3900" dirty="0" err="1">
-                <a:solidFill>
-                  <a:schemeClr val="bg1"/>
-                </a:solidFill>
-              </a:rPr>
-              <a:t>Thank</a:t>
-            </a:r>
-            <a:r>
-              <a:rPr lang="nb-NO" sz="3900" dirty="0">
-                <a:solidFill>
-                  <a:schemeClr val="bg1"/>
-                </a:solidFill>
-              </a:rPr>
-              <a:t> </a:t>
-            </a:r>
-            <a:r>
-              <a:rPr lang="nb-NO" sz="3900" dirty="0" err="1">
-                <a:solidFill>
-                  <a:schemeClr val="bg1"/>
-                </a:solidFill>
-              </a:rPr>
-              <a:t>you</a:t>
-            </a:r>
-            <a:r>
-              <a:rPr lang="nb-NO" sz="3900" dirty="0">
-                <a:solidFill>
-                  <a:schemeClr val="bg1"/>
-                </a:solidFill>
-              </a:rPr>
-              <a:t> all for </a:t>
-            </a:r>
-            <a:r>
-              <a:rPr lang="nb-NO" sz="3900" dirty="0" err="1">
-                <a:solidFill>
-                  <a:schemeClr val="bg1"/>
-                </a:solidFill>
-              </a:rPr>
-              <a:t>your</a:t>
-            </a:r>
-            <a:r>
-              <a:rPr lang="nb-NO" sz="3900" dirty="0">
-                <a:solidFill>
-                  <a:schemeClr val="bg1"/>
-                </a:solidFill>
-              </a:rPr>
-              <a:t> time and </a:t>
-            </a:r>
-            <a:r>
-              <a:rPr lang="nb-NO" sz="3900" dirty="0" err="1">
-                <a:solidFill>
-                  <a:schemeClr val="bg1"/>
-                </a:solidFill>
-              </a:rPr>
-              <a:t>patience</a:t>
-            </a:r>
-            <a:r>
-              <a:rPr lang="nb-NO" sz="3900" dirty="0">
-                <a:solidFill>
-                  <a:schemeClr val="bg1"/>
-                </a:solidFill>
-              </a:rPr>
-              <a:t>. </a:t>
-            </a:r>
-          </a:p>
-          <a:p>
-            <a:pPr marL="0" indent="0" algn="ctr">
-              <a:buNone/>
-            </a:pPr>
-            <a:r>
-              <a:rPr lang="nb-NO" sz="3900" dirty="0">
-                <a:solidFill>
-                  <a:schemeClr val="bg1"/>
-                </a:solidFill>
-              </a:rPr>
-              <a:t>Happy Hollidays! </a:t>
-            </a:r>
-            <a:r>
-              <a:rPr lang="nb-NO" sz="3900" dirty="0">
-                <a:solidFill>
-                  <a:schemeClr val="bg1"/>
-                </a:solidFill>
-                <a:sym typeface="Wingdings" pitchFamily="2" charset="2"/>
-              </a:rPr>
-              <a:t></a:t>
-            </a:r>
-          </a:p>
-          <a:p>
-            <a:pPr marL="0" indent="0">
-              <a:buNone/>
-            </a:pPr>
-            <a:r>
-              <a:rPr lang="nb-NO" sz="3900" dirty="0">
-                <a:solidFill>
-                  <a:schemeClr val="bg1"/>
-                </a:solidFill>
-                <a:sym typeface="Wingdings" pitchFamily="2" charset="2"/>
-              </a:rPr>
-              <a:t>		                                               </a:t>
-            </a:r>
-            <a:r>
-              <a:rPr lang="nb-NO" sz="1800" dirty="0" err="1">
-                <a:solidFill>
-                  <a:schemeClr val="bg1"/>
-                </a:solidFill>
-              </a:rPr>
-              <a:t>Created</a:t>
-            </a:r>
-            <a:r>
-              <a:rPr lang="nb-NO" sz="1800" dirty="0">
-                <a:solidFill>
-                  <a:schemeClr val="bg1"/>
-                </a:solidFill>
-              </a:rPr>
-              <a:t> By Filip Nordhagen</a:t>
-            </a:r>
-          </a:p>
-          <a:p>
-            <a:pPr marL="0" indent="0" algn="ctr">
-              <a:buNone/>
-            </a:pPr>
-            <a:endParaRPr lang="nb-NO" sz="3900" dirty="0">
-              <a:solidFill>
-                <a:schemeClr val="bg1"/>
-              </a:solidFill>
-            </a:endParaRPr>
-          </a:p>
-        </p:txBody>
-      </p:sp>
-    </p:spTree>
-    <p:extLst>
-      <p:ext uri="{BB962C8B-B14F-4D97-AF65-F5344CB8AC3E}">
-        <p14:creationId xmlns:p14="http://schemas.microsoft.com/office/powerpoint/2010/main" val="332550349"/>
       </p:ext>
     </p:extLst>
   </p:cSld>

</xml_diff>